<commit_message>
Poster ModAH final version
</commit_message>
<xml_diff>
--- a/docs/Poster_ModAH_sbasak.pptx
+++ b/docs/Poster_ModAH_sbasak.pptx
@@ -197,7 +197,7 @@
           <a:p>
             <a:fld id="{30B2879C-E2E7-41DD-8C48-B2C9A03F15D4}" type="datetimeFigureOut">
               <a:rPr lang="fr-FR" smtClean="0"/>
-              <a:t>01/08/2024</a:t>
+              <a:t>02/08/2024</a:t>
             </a:fld>
             <a:endParaRPr lang="fr-FR"/>
           </a:p>
@@ -596,7 +596,7 @@
           <a:p>
             <a:fld id="{36858CB8-11F8-4AAC-AB86-67A36E1B5295}" type="datetimeFigureOut">
               <a:rPr lang="fr-FR" smtClean="0"/>
-              <a:t>01/08/2024</a:t>
+              <a:t>02/08/2024</a:t>
             </a:fld>
             <a:endParaRPr lang="fr-FR" dirty="0"/>
           </a:p>
@@ -766,7 +766,7 @@
           <a:p>
             <a:fld id="{36858CB8-11F8-4AAC-AB86-67A36E1B5295}" type="datetimeFigureOut">
               <a:rPr lang="fr-FR" smtClean="0"/>
-              <a:t>01/08/2024</a:t>
+              <a:t>02/08/2024</a:t>
             </a:fld>
             <a:endParaRPr lang="fr-FR" dirty="0"/>
           </a:p>
@@ -946,7 +946,7 @@
           <a:p>
             <a:fld id="{36858CB8-11F8-4AAC-AB86-67A36E1B5295}" type="datetimeFigureOut">
               <a:rPr lang="fr-FR" smtClean="0"/>
-              <a:t>01/08/2024</a:t>
+              <a:t>02/08/2024</a:t>
             </a:fld>
             <a:endParaRPr lang="fr-FR" dirty="0"/>
           </a:p>
@@ -1116,7 +1116,7 @@
           <a:p>
             <a:fld id="{36858CB8-11F8-4AAC-AB86-67A36E1B5295}" type="datetimeFigureOut">
               <a:rPr lang="fr-FR" smtClean="0"/>
-              <a:t>01/08/2024</a:t>
+              <a:t>02/08/2024</a:t>
             </a:fld>
             <a:endParaRPr lang="fr-FR" dirty="0"/>
           </a:p>
@@ -1360,7 +1360,7 @@
           <a:p>
             <a:fld id="{36858CB8-11F8-4AAC-AB86-67A36E1B5295}" type="datetimeFigureOut">
               <a:rPr lang="fr-FR" smtClean="0"/>
-              <a:t>01/08/2024</a:t>
+              <a:t>02/08/2024</a:t>
             </a:fld>
             <a:endParaRPr lang="fr-FR" dirty="0"/>
           </a:p>
@@ -1592,7 +1592,7 @@
           <a:p>
             <a:fld id="{36858CB8-11F8-4AAC-AB86-67A36E1B5295}" type="datetimeFigureOut">
               <a:rPr lang="fr-FR" smtClean="0"/>
-              <a:t>01/08/2024</a:t>
+              <a:t>02/08/2024</a:t>
             </a:fld>
             <a:endParaRPr lang="fr-FR" dirty="0"/>
           </a:p>
@@ -1959,7 +1959,7 @@
           <a:p>
             <a:fld id="{36858CB8-11F8-4AAC-AB86-67A36E1B5295}" type="datetimeFigureOut">
               <a:rPr lang="fr-FR" smtClean="0"/>
-              <a:t>01/08/2024</a:t>
+              <a:t>02/08/2024</a:t>
             </a:fld>
             <a:endParaRPr lang="fr-FR" dirty="0"/>
           </a:p>
@@ -2077,7 +2077,7 @@
           <a:p>
             <a:fld id="{36858CB8-11F8-4AAC-AB86-67A36E1B5295}" type="datetimeFigureOut">
               <a:rPr lang="fr-FR" smtClean="0"/>
-              <a:t>01/08/2024</a:t>
+              <a:t>02/08/2024</a:t>
             </a:fld>
             <a:endParaRPr lang="fr-FR" dirty="0"/>
           </a:p>
@@ -2172,7 +2172,7 @@
           <a:p>
             <a:fld id="{36858CB8-11F8-4AAC-AB86-67A36E1B5295}" type="datetimeFigureOut">
               <a:rPr lang="fr-FR" smtClean="0"/>
-              <a:t>01/08/2024</a:t>
+              <a:t>02/08/2024</a:t>
             </a:fld>
             <a:endParaRPr lang="fr-FR" dirty="0"/>
           </a:p>
@@ -2449,7 +2449,7 @@
           <a:p>
             <a:fld id="{36858CB8-11F8-4AAC-AB86-67A36E1B5295}" type="datetimeFigureOut">
               <a:rPr lang="fr-FR" smtClean="0"/>
-              <a:t>01/08/2024</a:t>
+              <a:t>02/08/2024</a:t>
             </a:fld>
             <a:endParaRPr lang="fr-FR" dirty="0"/>
           </a:p>
@@ -2706,7 +2706,7 @@
           <a:p>
             <a:fld id="{36858CB8-11F8-4AAC-AB86-67A36E1B5295}" type="datetimeFigureOut">
               <a:rPr lang="fr-FR" smtClean="0"/>
-              <a:t>01/08/2024</a:t>
+              <a:t>02/08/2024</a:t>
             </a:fld>
             <a:endParaRPr lang="fr-FR" dirty="0"/>
           </a:p>
@@ -2919,7 +2919,7 @@
           <a:p>
             <a:fld id="{36858CB8-11F8-4AAC-AB86-67A36E1B5295}" type="datetimeFigureOut">
               <a:rPr lang="fr-FR" smtClean="0"/>
-              <a:t>01/08/2024</a:t>
+              <a:t>02/08/2024</a:t>
             </a:fld>
             <a:endParaRPr lang="fr-FR" dirty="0"/>
           </a:p>
@@ -3414,20 +3414,20 @@
               </a:rPr>
             </a:br>
             <a:r>
-              <a:rPr lang="it-IT" sz="4000" dirty="0">
+              <a:rPr lang="it-IT" sz="6000" u="sng" dirty="0" smtClean="0">
+                <a:solidFill>
+                  <a:schemeClr val="bg1"/>
+                </a:solidFill>
+              </a:rPr>
+              <a:t>Subhasish Basak</a:t>
+            </a:r>
+            <a:r>
+              <a:rPr lang="it-IT" sz="3600" dirty="0">
                 <a:solidFill>
                   <a:schemeClr val="bg1"/>
                 </a:solidFill>
               </a:rPr>
               <a:t>1</a:t>
-            </a:r>
-            <a:r>
-              <a:rPr lang="it-IT" sz="6000" u="sng" dirty="0">
-                <a:solidFill>
-                  <a:schemeClr val="bg1"/>
-                </a:solidFill>
-              </a:rPr>
-              <a:t>Subhasish Basak</a:t>
             </a:r>
             <a:r>
               <a:rPr lang="it-IT" sz="6000" dirty="0">
@@ -3438,7 +3438,15 @@
               <a:t>, </a:t>
             </a:r>
             <a:r>
-              <a:rPr lang="it-IT" sz="4000" dirty="0">
+              <a:rPr lang="it-IT" sz="6000" dirty="0" smtClean="0">
+                <a:solidFill>
+                  <a:schemeClr val="bg1"/>
+                </a:solidFill>
+              </a:rPr>
+              <a:t>Nunzio Sarnino</a:t>
+            </a:r>
+            <a:r>
+              <a:rPr lang="it-IT" sz="3600" dirty="0" smtClean="0">
                 <a:solidFill>
                   <a:schemeClr val="bg1"/>
                 </a:solidFill>
@@ -3446,15 +3454,15 @@
               <a:t>2</a:t>
             </a:r>
             <a:r>
-              <a:rPr lang="it-IT" sz="6000" dirty="0">
+              <a:rPr lang="it-IT" sz="6000" dirty="0" smtClean="0">
                 <a:solidFill>
                   <a:schemeClr val="bg1"/>
                 </a:solidFill>
               </a:rPr>
-              <a:t>Nunzio Sarnino, </a:t>
-            </a:r>
-            <a:r>
-              <a:rPr lang="it-IT" sz="4000" dirty="0">
+              <a:t>, Roswitha Merle</a:t>
+            </a:r>
+            <a:r>
+              <a:rPr lang="it-IT" sz="3600" dirty="0" smtClean="0">
                 <a:solidFill>
                   <a:schemeClr val="bg1"/>
                 </a:solidFill>
@@ -3462,28 +3470,20 @@
               <a:t>2</a:t>
             </a:r>
             <a:r>
-              <a:rPr lang="it-IT" sz="6000" dirty="0">
+              <a:rPr lang="it-IT" sz="6000" dirty="0" smtClean="0">
                 <a:solidFill>
                   <a:schemeClr val="bg1"/>
                 </a:solidFill>
               </a:rPr>
-              <a:t>Roswitha Merle, </a:t>
-            </a:r>
-            <a:r>
-              <a:rPr lang="it-IT" sz="4000" dirty="0">
+              <a:t>, Lucie Collineau</a:t>
+            </a:r>
+            <a:r>
+              <a:rPr lang="it-IT" sz="3600" dirty="0" smtClean="0">
                 <a:solidFill>
                   <a:schemeClr val="bg1"/>
                 </a:solidFill>
               </a:rPr>
               <a:t>1</a:t>
-            </a:r>
-            <a:r>
-              <a:rPr lang="it-IT" sz="6000" dirty="0">
-                <a:solidFill>
-                  <a:schemeClr val="bg1"/>
-                </a:solidFill>
-              </a:rPr>
-              <a:t>Lucie Collineau</a:t>
             </a:r>
             <a:r>
               <a:rPr lang="it-IT" sz="1050" dirty="0">
@@ -3506,15 +3506,15 @@
                   <a:schemeClr val="bg1"/>
                 </a:solidFill>
               </a:rPr>
-              <a:t>1. ANSES – Laboratoire de Lyon 2. </a:t>
-            </a:r>
-            <a:r>
-              <a:rPr lang="fr-FR" sz="4800" dirty="0" err="1">
+              <a:t>1. ANSES – Laboratoire de </a:t>
+            </a:r>
+            <a:r>
+              <a:rPr lang="fr-FR" sz="4800" dirty="0" smtClean="0">
                 <a:solidFill>
                   <a:schemeClr val="bg1"/>
                 </a:solidFill>
               </a:rPr>
-              <a:t>Freie</a:t>
+              <a:t>Lyon, France </a:t>
             </a:r>
             <a:r>
               <a:rPr lang="fr-FR" sz="4800" dirty="0">
@@ -3522,23 +3522,15 @@
                   <a:schemeClr val="bg1"/>
                 </a:solidFill>
               </a:rPr>
-              <a:t> </a:t>
-            </a:r>
-            <a:r>
-              <a:rPr lang="fr-FR" sz="4800" dirty="0" err="1">
+              <a:t>2. Freie Universität </a:t>
+            </a:r>
+            <a:r>
+              <a:rPr lang="fr-FR" sz="4800" dirty="0" smtClean="0">
                 <a:solidFill>
                   <a:schemeClr val="bg1"/>
                 </a:solidFill>
               </a:rPr>
-              <a:t>Universität</a:t>
-            </a:r>
-            <a:r>
-              <a:rPr lang="fr-FR" sz="4800" dirty="0">
-                <a:solidFill>
-                  <a:schemeClr val="bg1"/>
-                </a:solidFill>
-              </a:rPr>
-              <a:t> Berlin </a:t>
+              <a:t>Berlin, Germany </a:t>
             </a:r>
             <a:endParaRPr lang="fr-FR" sz="4800" dirty="0" smtClean="0">
               <a:solidFill>
@@ -3556,7 +3548,7 @@
         </p:nvSpPr>
         <p:spPr>
           <a:xfrm>
-            <a:off x="1252465" y="6626994"/>
+            <a:off x="1098153" y="6499339"/>
             <a:ext cx="9739423" cy="1015663"/>
           </a:xfrm>
           <a:prstGeom prst="rect">
@@ -3578,424 +3570,6 @@
           </a:p>
         </p:txBody>
       </p:sp>
-      <p:grpSp>
-        <p:nvGrpSpPr>
-          <p:cNvPr id="33" name="Groupe 32"/>
-          <p:cNvGrpSpPr/>
-          <p:nvPr/>
-        </p:nvGrpSpPr>
-        <p:grpSpPr>
-          <a:xfrm>
-            <a:off x="19658021" y="8079031"/>
-            <a:ext cx="9405669" cy="5909310"/>
-            <a:chOff x="19897835" y="8079031"/>
-            <a:chExt cx="9405669" cy="5909310"/>
-          </a:xfrm>
-        </p:grpSpPr>
-        <p:sp>
-          <p:nvSpPr>
-            <p:cNvPr id="24" name="ZoneTexte 23"/>
-            <p:cNvSpPr txBox="1"/>
-            <p:nvPr/>
-          </p:nvSpPr>
-          <p:spPr>
-            <a:xfrm>
-              <a:off x="19897835" y="8079031"/>
-              <a:ext cx="9405669" cy="5909310"/>
-            </a:xfrm>
-            <a:prstGeom prst="rect">
-              <a:avLst/>
-            </a:prstGeom>
-            <a:noFill/>
-          </p:spPr>
-          <p:txBody>
-            <a:bodyPr wrap="square" rtlCol="0">
-              <a:spAutoFit/>
-            </a:bodyPr>
-            <a:lstStyle/>
-            <a:p>
-              <a:pPr>
-                <a:lnSpc>
-                  <a:spcPct val="150000"/>
-                </a:lnSpc>
-              </a:pPr>
-              <a:r>
-                <a:rPr lang="fr-FR" sz="3600" b="1" dirty="0" smtClean="0"/>
-                <a:t>WORKFLOW – WP 3</a:t>
-              </a:r>
-            </a:p>
-            <a:p>
-              <a:pPr marL="571500" indent="-571500">
-                <a:buFont typeface="Arial" panose="020B0604020202020204" pitchFamily="34" charset="0"/>
-                <a:buChar char="•"/>
-              </a:pPr>
-              <a:r>
-                <a:rPr lang="fr-FR" sz="3600" dirty="0"/>
-                <a:t>Quantitative Risk </a:t>
-              </a:r>
-              <a:r>
-                <a:rPr lang="fr-FR" sz="3600" dirty="0" smtClean="0"/>
-                <a:t>Assessment with pathways:</a:t>
-              </a:r>
-            </a:p>
-            <a:p>
-              <a:pPr marL="571500" indent="-571500">
-                <a:buFont typeface="Arial" panose="020B0604020202020204" pitchFamily="34" charset="0"/>
-                <a:buChar char="•"/>
-              </a:pPr>
-              <a:endParaRPr lang="fr-FR" sz="3600" dirty="0" smtClean="0"/>
-            </a:p>
-            <a:p>
-              <a:pPr marL="571500" indent="-571500">
-                <a:buFont typeface="Arial" panose="020B0604020202020204" pitchFamily="34" charset="0"/>
-                <a:buChar char="•"/>
-              </a:pPr>
-              <a:endParaRPr lang="fr-FR" sz="3600" dirty="0"/>
-            </a:p>
-            <a:p>
-              <a:pPr marL="571500" indent="-571500">
-                <a:buFont typeface="Arial" panose="020B0604020202020204" pitchFamily="34" charset="0"/>
-                <a:buChar char="•"/>
-              </a:pPr>
-              <a:endParaRPr lang="fr-FR" sz="3600" dirty="0" smtClean="0"/>
-            </a:p>
-            <a:p>
-              <a:endParaRPr lang="fr-FR" sz="3600" dirty="0" smtClean="0"/>
-            </a:p>
-            <a:p>
-              <a:pPr marL="571500" indent="-571500">
-                <a:buFont typeface="Arial" panose="020B0604020202020204" pitchFamily="34" charset="0"/>
-                <a:buChar char="•"/>
-              </a:pPr>
-              <a:endParaRPr lang="fr-FR" sz="3600" dirty="0"/>
-            </a:p>
-            <a:p>
-              <a:pPr marL="571500" indent="-571500">
-                <a:buFont typeface="Arial" panose="020B0604020202020204" pitchFamily="34" charset="0"/>
-                <a:buChar char="•"/>
-              </a:pPr>
-              <a:endParaRPr lang="fr-FR" sz="3600" dirty="0" smtClean="0"/>
-            </a:p>
-            <a:p>
-              <a:pPr marL="571500" indent="-571500">
-                <a:buFont typeface="Arial" panose="020B0604020202020204" pitchFamily="34" charset="0"/>
-                <a:buChar char="•"/>
-              </a:pPr>
-              <a:r>
-                <a:rPr lang="fr-FR" sz="3600" dirty="0" err="1" smtClean="0"/>
-                <a:t>Incorporate</a:t>
-              </a:r>
-              <a:r>
-                <a:rPr lang="fr-FR" sz="3600" dirty="0" smtClean="0"/>
-                <a:t> on-</a:t>
-              </a:r>
-              <a:r>
-                <a:rPr lang="fr-FR" sz="3600" dirty="0" err="1" smtClean="0"/>
-                <a:t>farm</a:t>
-              </a:r>
-              <a:r>
-                <a:rPr lang="fr-FR" sz="3600" dirty="0" smtClean="0"/>
-                <a:t> intervention </a:t>
-              </a:r>
-              <a:r>
-                <a:rPr lang="fr-FR" sz="3600" dirty="0" err="1" smtClean="0"/>
-                <a:t>measures</a:t>
-              </a:r>
-              <a:endParaRPr lang="fr-FR" sz="3600" dirty="0" smtClean="0"/>
-            </a:p>
-            <a:p>
-              <a:pPr marL="571500" indent="-571500" algn="ctr">
-                <a:buFont typeface="Arial" panose="020B0604020202020204" pitchFamily="34" charset="0"/>
-                <a:buChar char="•"/>
-              </a:pPr>
-              <a:endParaRPr lang="fr-FR" sz="3600" dirty="0"/>
-            </a:p>
-          </p:txBody>
-        </p:sp>
-        <p:grpSp>
-          <p:nvGrpSpPr>
-            <p:cNvPr id="29" name="Groupe 28"/>
-            <p:cNvGrpSpPr/>
-            <p:nvPr/>
-          </p:nvGrpSpPr>
-          <p:grpSpPr>
-            <a:xfrm>
-              <a:off x="21358589" y="9667497"/>
-              <a:ext cx="6613452" cy="2872755"/>
-              <a:chOff x="19206492" y="9824303"/>
-              <a:chExt cx="6613452" cy="2872755"/>
-            </a:xfrm>
-          </p:grpSpPr>
-          <p:sp>
-            <p:nvSpPr>
-              <p:cNvPr id="25" name="Rectangle à coins arrondis 24"/>
-              <p:cNvSpPr/>
-              <p:nvPr/>
-            </p:nvSpPr>
-            <p:spPr>
-              <a:xfrm>
-                <a:off x="19206492" y="9824303"/>
-                <a:ext cx="6613451" cy="818255"/>
-              </a:xfrm>
-              <a:prstGeom prst="roundRect">
-                <a:avLst/>
-              </a:prstGeom>
-              <a:solidFill>
-                <a:schemeClr val="accent1">
-                  <a:lumMod val="40000"/>
-                  <a:lumOff val="60000"/>
-                </a:schemeClr>
-              </a:solidFill>
-            </p:spPr>
-            <p:style>
-              <a:lnRef idx="2">
-                <a:schemeClr val="accent1">
-                  <a:shade val="50000"/>
-                </a:schemeClr>
-              </a:lnRef>
-              <a:fillRef idx="1">
-                <a:schemeClr val="accent1"/>
-              </a:fillRef>
-              <a:effectRef idx="0">
-                <a:schemeClr val="accent1"/>
-              </a:effectRef>
-              <a:fontRef idx="minor">
-                <a:schemeClr val="lt1"/>
-              </a:fontRef>
-            </p:style>
-            <p:txBody>
-              <a:bodyPr rtlCol="0" anchor="ctr"/>
-              <a:lstStyle/>
-              <a:p>
-                <a:pPr algn="ctr"/>
-                <a:r>
-                  <a:rPr lang="fr-FR" sz="3600" dirty="0" smtClean="0">
-                    <a:solidFill>
-                      <a:schemeClr val="tx1"/>
-                    </a:solidFill>
-                  </a:rPr>
-                  <a:t>FOOD-BORNE</a:t>
-                </a:r>
-                <a:endParaRPr lang="fr-FR" sz="3600" dirty="0">
-                  <a:solidFill>
-                    <a:schemeClr val="tx1"/>
-                  </a:solidFill>
-                </a:endParaRPr>
-              </a:p>
-            </p:txBody>
-          </p:sp>
-          <p:sp>
-            <p:nvSpPr>
-              <p:cNvPr id="26" name="Rectangle à coins arrondis 25"/>
-              <p:cNvSpPr/>
-              <p:nvPr/>
-            </p:nvSpPr>
-            <p:spPr>
-              <a:xfrm>
-                <a:off x="19206492" y="10831365"/>
-                <a:ext cx="6613451" cy="818255"/>
-              </a:xfrm>
-              <a:prstGeom prst="roundRect">
-                <a:avLst/>
-              </a:prstGeom>
-              <a:solidFill>
-                <a:schemeClr val="accent1">
-                  <a:lumMod val="40000"/>
-                  <a:lumOff val="60000"/>
-                </a:schemeClr>
-              </a:solidFill>
-            </p:spPr>
-            <p:style>
-              <a:lnRef idx="2">
-                <a:schemeClr val="accent1">
-                  <a:shade val="50000"/>
-                </a:schemeClr>
-              </a:lnRef>
-              <a:fillRef idx="1">
-                <a:schemeClr val="accent1"/>
-              </a:fillRef>
-              <a:effectRef idx="0">
-                <a:schemeClr val="accent1"/>
-              </a:effectRef>
-              <a:fontRef idx="minor">
-                <a:schemeClr val="lt1"/>
-              </a:fontRef>
-            </p:style>
-            <p:txBody>
-              <a:bodyPr rtlCol="0" anchor="ctr"/>
-              <a:lstStyle/>
-              <a:p>
-                <a:pPr algn="ctr"/>
-                <a:r>
-                  <a:rPr lang="fr-FR" sz="3600" dirty="0" smtClean="0">
-                    <a:solidFill>
-                      <a:schemeClr val="tx1"/>
-                    </a:solidFill>
-                  </a:rPr>
-                  <a:t>ENVIRONMENTAL</a:t>
-                </a:r>
-                <a:endParaRPr lang="fr-FR" sz="3600" dirty="0">
-                  <a:solidFill>
-                    <a:schemeClr val="tx1"/>
-                  </a:solidFill>
-                </a:endParaRPr>
-              </a:p>
-            </p:txBody>
-          </p:sp>
-          <p:sp>
-            <p:nvSpPr>
-              <p:cNvPr id="27" name="Rectangle à coins arrondis 26"/>
-              <p:cNvSpPr/>
-              <p:nvPr/>
-            </p:nvSpPr>
-            <p:spPr>
-              <a:xfrm>
-                <a:off x="19206493" y="11878803"/>
-                <a:ext cx="6613451" cy="818255"/>
-              </a:xfrm>
-              <a:prstGeom prst="roundRect">
-                <a:avLst/>
-              </a:prstGeom>
-              <a:solidFill>
-                <a:schemeClr val="accent1">
-                  <a:lumMod val="40000"/>
-                  <a:lumOff val="60000"/>
-                </a:schemeClr>
-              </a:solidFill>
-            </p:spPr>
-            <p:style>
-              <a:lnRef idx="2">
-                <a:schemeClr val="accent1">
-                  <a:shade val="50000"/>
-                </a:schemeClr>
-              </a:lnRef>
-              <a:fillRef idx="1">
-                <a:schemeClr val="accent1"/>
-              </a:fillRef>
-              <a:effectRef idx="0">
-                <a:schemeClr val="accent1"/>
-              </a:effectRef>
-              <a:fontRef idx="minor">
-                <a:schemeClr val="lt1"/>
-              </a:fontRef>
-            </p:style>
-            <p:txBody>
-              <a:bodyPr rtlCol="0" anchor="ctr"/>
-              <a:lstStyle/>
-              <a:p>
-                <a:pPr algn="ctr"/>
-                <a:r>
-                  <a:rPr lang="fr-FR" sz="3600" dirty="0" smtClean="0">
-                    <a:solidFill>
-                      <a:schemeClr val="tx1"/>
-                    </a:solidFill>
-                  </a:rPr>
-                  <a:t>OCCUPATIONAL</a:t>
-                </a:r>
-                <a:endParaRPr lang="fr-FR" sz="3600" dirty="0">
-                  <a:solidFill>
-                    <a:schemeClr val="tx1"/>
-                  </a:solidFill>
-                </a:endParaRPr>
-              </a:p>
-            </p:txBody>
-          </p:sp>
-        </p:grpSp>
-      </p:grpSp>
-      <p:sp>
-        <p:nvSpPr>
-          <p:cNvPr id="28" name="Rectangle à coins arrondis 27"/>
-          <p:cNvSpPr/>
-          <p:nvPr/>
-        </p:nvSpPr>
-        <p:spPr>
-          <a:xfrm>
-            <a:off x="19445371" y="8056431"/>
-            <a:ext cx="9718158" cy="5762662"/>
-          </a:xfrm>
-          <a:prstGeom prst="roundRect">
-            <a:avLst>
-              <a:gd name="adj" fmla="val 5309"/>
-            </a:avLst>
-          </a:prstGeom>
-          <a:solidFill>
-            <a:srgbClr val="5B9BD5">
-              <a:alpha val="0"/>
-            </a:srgbClr>
-          </a:solidFill>
-          <a:ln w="38100" cmpd="dbl">
-            <a:solidFill>
-              <a:schemeClr val="accent1">
-                <a:lumMod val="50000"/>
-              </a:schemeClr>
-            </a:solidFill>
-          </a:ln>
-        </p:spPr>
-        <p:style>
-          <a:lnRef idx="2">
-            <a:schemeClr val="accent1">
-              <a:shade val="50000"/>
-            </a:schemeClr>
-          </a:lnRef>
-          <a:fillRef idx="1">
-            <a:schemeClr val="accent1"/>
-          </a:fillRef>
-          <a:effectRef idx="0">
-            <a:schemeClr val="accent1"/>
-          </a:effectRef>
-          <a:fontRef idx="minor">
-            <a:schemeClr val="lt1"/>
-          </a:fontRef>
-        </p:style>
-        <p:txBody>
-          <a:bodyPr rtlCol="0" anchor="ctr"/>
-          <a:lstStyle/>
-          <a:p>
-            <a:pPr algn="ctr"/>
-            <a:endParaRPr lang="fr-FR" dirty="0"/>
-          </a:p>
-        </p:txBody>
-      </p:sp>
-      <p:sp>
-        <p:nvSpPr>
-          <p:cNvPr id="31" name="Flèche droite 30"/>
-          <p:cNvSpPr/>
-          <p:nvPr/>
-        </p:nvSpPr>
-        <p:spPr>
-          <a:xfrm>
-            <a:off x="17615668" y="10443073"/>
-            <a:ext cx="1382232" cy="899597"/>
-          </a:xfrm>
-          <a:prstGeom prst="rightArrow">
-            <a:avLst/>
-          </a:prstGeom>
-        </p:spPr>
-        <p:style>
-          <a:lnRef idx="2">
-            <a:schemeClr val="accent1">
-              <a:shade val="50000"/>
-            </a:schemeClr>
-          </a:lnRef>
-          <a:fillRef idx="1">
-            <a:schemeClr val="accent1"/>
-          </a:fillRef>
-          <a:effectRef idx="0">
-            <a:schemeClr val="accent1"/>
-          </a:effectRef>
-          <a:fontRef idx="minor">
-            <a:schemeClr val="lt1"/>
-          </a:fontRef>
-        </p:style>
-        <p:txBody>
-          <a:bodyPr rtlCol="0" anchor="ctr"/>
-          <a:lstStyle/>
-          <a:p>
-            <a:pPr algn="ctr"/>
-            <a:endParaRPr lang="fr-FR"/>
-          </a:p>
-        </p:txBody>
-      </p:sp>
       <p:sp>
         <p:nvSpPr>
           <p:cNvPr id="32" name="ZoneTexte 31"/>
@@ -4004,7 +3578,7 @@
         </p:nvSpPr>
         <p:spPr>
           <a:xfrm>
-            <a:off x="1252465" y="14160724"/>
+            <a:off x="1101317" y="13958651"/>
             <a:ext cx="28112485" cy="1015663"/>
           </a:xfrm>
           <a:prstGeom prst="rect">
@@ -4054,7 +3628,7 @@
         </p:nvSpPr>
         <p:spPr>
           <a:xfrm>
-            <a:off x="1298528" y="24729387"/>
+            <a:off x="1134308" y="24580337"/>
             <a:ext cx="21204477" cy="1015663"/>
           </a:xfrm>
           <a:prstGeom prst="rect">
@@ -4277,36 +3851,6 @@
       </p:sp>
       <p:pic>
         <p:nvPicPr>
-          <p:cNvPr id="110" name="Image 109"/>
-          <p:cNvPicPr>
-            <a:picLocks noChangeAspect="1"/>
-          </p:cNvPicPr>
-          <p:nvPr/>
-        </p:nvPicPr>
-        <p:blipFill>
-          <a:blip r:embed="rId8" cstate="print">
-            <a:extLst>
-              <a:ext uri="{28A0092B-C50C-407E-A947-70E740481C1C}">
-                <a14:useLocalDpi xmlns:a14="http://schemas.microsoft.com/office/drawing/2010/main" val="0"/>
-              </a:ext>
-            </a:extLst>
-          </a:blip>
-          <a:stretch>
-            <a:fillRect/>
-          </a:stretch>
-        </p:blipFill>
-        <p:spPr>
-          <a:xfrm>
-            <a:off x="27888439" y="9712734"/>
-            <a:ext cx="727780" cy="727780"/>
-          </a:xfrm>
-          <a:prstGeom prst="rect">
-            <a:avLst/>
-          </a:prstGeom>
-        </p:spPr>
-      </p:pic>
-      <p:pic>
-        <p:nvPicPr>
           <p:cNvPr id="112" name="Image 111"/>
           <p:cNvPicPr>
             <a:picLocks noChangeAspect="1"/>
@@ -4327,7 +3871,7 @@
         </p:blipFill>
         <p:spPr>
           <a:xfrm>
-            <a:off x="17169247" y="14235328"/>
+            <a:off x="16991124" y="14212736"/>
             <a:ext cx="727780" cy="727780"/>
           </a:xfrm>
           <a:prstGeom prst="rect">
@@ -4343,10 +3887,10 @@
         </p:nvGrpSpPr>
         <p:grpSpPr>
           <a:xfrm>
-            <a:off x="1238086" y="15493663"/>
-            <a:ext cx="28107527" cy="8938894"/>
+            <a:off x="1094372" y="15398217"/>
+            <a:ext cx="28119430" cy="9000797"/>
             <a:chOff x="1245211" y="15407559"/>
-            <a:chExt cx="28107527" cy="8938894"/>
+            <a:chExt cx="28119430" cy="9000797"/>
           </a:xfrm>
         </p:grpSpPr>
         <p:sp>
@@ -4388,9 +3932,9 @@
           <p:grpSpPr>
             <a:xfrm>
               <a:off x="1245211" y="15407559"/>
-              <a:ext cx="28107527" cy="8938894"/>
+              <a:ext cx="28119430" cy="9000797"/>
               <a:chOff x="1092807" y="16260635"/>
-              <a:chExt cx="28107527" cy="8938894"/>
+              <a:chExt cx="28119430" cy="9000797"/>
             </a:xfrm>
           </p:grpSpPr>
           <p:grpSp>
@@ -5074,8 +4618,8 @@
                   </p:nvSpPr>
                   <p:spPr>
                     <a:xfrm>
-                      <a:off x="12473436" y="20474361"/>
-                      <a:ext cx="16485947" cy="646331"/>
+                      <a:off x="12367850" y="20425437"/>
+                      <a:ext cx="16680720" cy="646331"/>
                     </a:xfrm>
                     <a:prstGeom prst="rect">
                       <a:avLst/>
@@ -5090,75 +4634,79 @@
                     <a:p>
                       <a:r>
                         <a:rPr lang="fr-FR" sz="3600" dirty="0" smtClean="0"/>
-                        <a:t>QRA model </a:t>
+                        <a:t>Simulates within flock </a:t>
                       </a:r>
                       <a:r>
-                        <a:rPr lang="fr-FR" sz="3600" dirty="0" err="1"/>
-                        <a:t>s</a:t>
+                        <a:rPr lang="fr-FR" sz="3600" dirty="0" smtClean="0">
+                          <a:solidFill>
+                            <a:srgbClr val="FF0000"/>
+                          </a:solidFill>
+                        </a:rPr>
+                        <a:t>Prevalence (P</a:t>
                       </a:r>
                       <a:r>
-                        <a:rPr lang="fr-FR" sz="3600" dirty="0" err="1" smtClean="0"/>
-                        <a:t>imulates</a:t>
+                        <a:rPr lang="fr-FR" sz="2400" dirty="0" smtClean="0">
+                          <a:solidFill>
+                            <a:srgbClr val="FF0000"/>
+                          </a:solidFill>
+                        </a:rPr>
+                        <a:t>prev</a:t>
+                      </a:r>
+                      <a:r>
+                        <a:rPr lang="fr-FR" sz="3600" dirty="0" smtClean="0">
+                          <a:solidFill>
+                            <a:srgbClr val="FF0000"/>
+                          </a:solidFill>
+                        </a:rPr>
+                        <a:t>)</a:t>
                       </a:r>
                       <a:r>
                         <a:rPr lang="fr-FR" sz="3600" dirty="0" smtClean="0"/>
                         <a:t> </a:t>
                       </a:r>
                       <a:r>
-                        <a:rPr lang="fr-FR" sz="3600" dirty="0" err="1" smtClean="0"/>
-                        <a:t>flock</a:t>
+                        <a:rPr lang="fr-FR" sz="3600" dirty="0" smtClean="0"/>
+                        <a:t>and </a:t>
                       </a:r>
                       <a:r>
-                        <a:rPr lang="fr-FR" sz="3600" dirty="0" smtClean="0"/>
-                        <a:t> </a:t>
-                      </a:r>
-                      <a:r>
-                        <a:rPr lang="fr-FR" sz="3600" dirty="0" err="1" smtClean="0">
+                        <a:rPr lang="fr-FR" sz="3600" dirty="0" smtClean="0">
                           <a:solidFill>
                             <a:srgbClr val="FF0000"/>
                           </a:solidFill>
                         </a:rPr>
-                        <a:t>Prevalence</a:t>
+                        <a:t>Load (C</a:t>
                       </a:r>
                       <a:r>
-                        <a:rPr lang="fr-FR" sz="3600" dirty="0" smtClean="0"/>
-                        <a:t> and </a:t>
-                      </a:r>
-                      <a:r>
-                        <a:rPr lang="fr-FR" sz="3600" dirty="0" err="1"/>
-                        <a:t>c</a:t>
-                      </a:r>
-                      <a:r>
-                        <a:rPr lang="fr-FR" sz="3600" dirty="0" err="1" smtClean="0"/>
-                        <a:t>arcass</a:t>
-                      </a:r>
-                      <a:r>
-                        <a:rPr lang="fr-FR" sz="3600" dirty="0" smtClean="0"/>
-                        <a:t>/portion </a:t>
-                      </a:r>
-                      <a:r>
-                        <a:rPr lang="fr-FR" sz="3600" dirty="0" err="1" smtClean="0">
+                        <a:rPr lang="fr-FR" sz="2400" dirty="0" smtClean="0">
                           <a:solidFill>
                             <a:srgbClr val="FF0000"/>
                           </a:solidFill>
                         </a:rPr>
-                        <a:t>Load</a:t>
+                        <a:t>load</a:t>
+                      </a:r>
+                      <a:r>
+                        <a:rPr lang="fr-FR" sz="3600" dirty="0" smtClean="0">
+                          <a:solidFill>
+                            <a:srgbClr val="FF0000"/>
+                          </a:solidFill>
+                        </a:rPr>
+                        <a:t>) </a:t>
                       </a:r>
                       <a:r>
                         <a:rPr lang="fr-FR" sz="3600" dirty="0" smtClean="0"/>
-                        <a:t> at the end of </a:t>
+                        <a:t>on</a:t>
                       </a:r>
                       <a:r>
-                        <a:rPr lang="fr-FR" sz="3600" dirty="0" err="1" smtClean="0"/>
-                        <a:t>each</a:t>
+                        <a:rPr lang="fr-FR" sz="3600" dirty="0" smtClean="0">
+                          <a:solidFill>
+                            <a:srgbClr val="FF0000"/>
+                          </a:solidFill>
+                        </a:rPr>
+                        <a:t> </a:t>
                       </a:r>
                       <a:r>
                         <a:rPr lang="fr-FR" sz="3600" dirty="0" smtClean="0"/>
-                        <a:t> </a:t>
-                      </a:r>
-                      <a:r>
-                        <a:rPr lang="fr-FR" sz="3600" dirty="0" err="1" smtClean="0"/>
-                        <a:t>step</a:t>
+                        <a:t>carcass/portion at each stage</a:t>
                       </a:r>
                       <a:endParaRPr lang="fr-FR" sz="3600" dirty="0"/>
                     </a:p>
@@ -5696,9 +5244,9 @@
             <p:grpSpPr>
               <a:xfrm>
                 <a:off x="1092807" y="16260635"/>
-                <a:ext cx="28107527" cy="8938894"/>
+                <a:ext cx="28119430" cy="9000797"/>
                 <a:chOff x="1092807" y="16260635"/>
-                <a:chExt cx="28107527" cy="8938894"/>
+                <a:chExt cx="28119430" cy="9000797"/>
               </a:xfrm>
             </p:grpSpPr>
             <p:grpSp>
@@ -5710,9 +5258,9 @@
               <p:grpSpPr>
                 <a:xfrm>
                   <a:off x="1092807" y="16260635"/>
-                  <a:ext cx="10853316" cy="5879949"/>
+                  <a:ext cx="10886417" cy="5879949"/>
                   <a:chOff x="1092807" y="16260635"/>
-                  <a:chExt cx="10853316" cy="5879949"/>
+                  <a:chExt cx="10886417" cy="5879949"/>
                 </a:xfrm>
               </p:grpSpPr>
               <p:sp>
@@ -5799,8 +5347,8 @@
                 </p:nvSpPr>
                 <p:spPr>
                   <a:xfrm>
-                    <a:off x="10638659" y="19163824"/>
-                    <a:ext cx="1273135" cy="1200329"/>
+                    <a:off x="10443731" y="19163824"/>
+                    <a:ext cx="1535493" cy="1754326"/>
                   </a:xfrm>
                   <a:prstGeom prst="rect">
                     <a:avLst/>
@@ -5813,16 +5361,15 @@
                   </a:bodyPr>
                   <a:lstStyle/>
                   <a:p>
-                    <a:r>
-                      <a:rPr lang="fr-FR" sz="3600" b="1" dirty="0" err="1" smtClean="0"/>
-                      <a:t>Flock</a:t>
-                    </a:r>
+                    <a:pPr algn="ctr"/>
                     <a:r>
                       <a:rPr lang="fr-FR" sz="3600" b="1" dirty="0" smtClean="0"/>
-                      <a:t> </a:t>
+                      <a:t>WithinFlock </a:t>
                     </a:r>
+                    <a:endParaRPr lang="fr-FR" sz="3600" b="1" dirty="0" smtClean="0"/>
                   </a:p>
                   <a:p>
+                    <a:pPr algn="ctr"/>
                     <a:r>
                       <a:rPr lang="fr-FR" sz="3600" b="1" dirty="0" err="1" smtClean="0"/>
                       <a:t>Prev</a:t>
@@ -5844,9 +5391,9 @@
                 <p:grpSpPr>
                   <a:xfrm>
                     <a:off x="1092807" y="16260635"/>
-                    <a:ext cx="9970097" cy="5879949"/>
+                    <a:ext cx="9761646" cy="5879949"/>
                     <a:chOff x="1092807" y="16260635"/>
-                    <a:chExt cx="9970097" cy="5879949"/>
+                    <a:chExt cx="9761646" cy="5879949"/>
                   </a:xfrm>
                 </p:grpSpPr>
                 <p:grpSp>
@@ -5858,9 +5405,9 @@
                   <p:grpSpPr>
                     <a:xfrm>
                       <a:off x="1092807" y="16260635"/>
-                      <a:ext cx="9970097" cy="5879949"/>
+                      <a:ext cx="9761646" cy="5879949"/>
                       <a:chOff x="1051993" y="16360886"/>
-                      <a:chExt cx="9970097" cy="5879949"/>
+                      <a:chExt cx="9761646" cy="5879949"/>
                     </a:xfrm>
                   </p:grpSpPr>
                   <p:grpSp>
@@ -5872,9 +5419,9 @@
                     <p:grpSpPr>
                       <a:xfrm>
                         <a:off x="1086322" y="16360886"/>
-                        <a:ext cx="9935768" cy="5879949"/>
+                        <a:ext cx="9727317" cy="5879949"/>
                         <a:chOff x="1081364" y="17531910"/>
-                        <a:chExt cx="9935768" cy="5879949"/>
+                        <a:chExt cx="9727317" cy="5879949"/>
                       </a:xfrm>
                     </p:grpSpPr>
                     <p:sp>
@@ -5917,9 +5464,9 @@
                       <p:grpSpPr>
                         <a:xfrm>
                           <a:off x="1081364" y="17531910"/>
-                          <a:ext cx="9935768" cy="5879949"/>
+                          <a:ext cx="9727317" cy="5879949"/>
                           <a:chOff x="1081364" y="17531910"/>
-                          <a:chExt cx="9935768" cy="5879949"/>
+                          <a:chExt cx="9727317" cy="5879949"/>
                         </a:xfrm>
                       </p:grpSpPr>
                       <p:sp>
@@ -5988,7 +5535,7 @@
                         </p:blipFill>
                         <p:spPr>
                           <a:xfrm>
-                            <a:off x="4258453" y="18996346"/>
+                            <a:off x="4289358" y="18995756"/>
                             <a:ext cx="801193" cy="783980"/>
                           </a:xfrm>
                           <a:prstGeom prst="rect">
@@ -6018,7 +5565,7 @@
                         </p:blipFill>
                         <p:spPr>
                           <a:xfrm>
-                            <a:off x="4194357" y="17995241"/>
+                            <a:off x="4284626" y="18010010"/>
                             <a:ext cx="801193" cy="783980"/>
                           </a:xfrm>
                           <a:prstGeom prst="rect">
@@ -6458,8 +6005,8 @@
                         </p:nvSpPr>
                         <p:spPr>
                           <a:xfrm>
-                            <a:off x="7786501" y="20681586"/>
-                            <a:ext cx="3230631" cy="1200329"/>
+                            <a:off x="7578050" y="20600788"/>
+                            <a:ext cx="3230631" cy="1754326"/>
                           </a:xfrm>
                           <a:prstGeom prst="rect">
                             <a:avLst/>
@@ -6475,16 +6022,23 @@
                             <a:pPr algn="ctr"/>
                             <a:r>
                               <a:rPr lang="fr-FR" sz="3600" b="1" dirty="0" smtClean="0"/>
-                              <a:t>HGT</a:t>
+                              <a:t>Horizontal </a:t>
                             </a:r>
                           </a:p>
                           <a:p>
                             <a:pPr algn="ctr"/>
                             <a:r>
-                              <a:rPr lang="fr-FR" sz="3600" b="1" dirty="0" err="1" smtClean="0"/>
-                              <a:t>Growth</a:t>
+                              <a:rPr lang="fr-FR" sz="3600" b="1" dirty="0" smtClean="0"/>
+                              <a:t>Gene</a:t>
                             </a:r>
-                            <a:endParaRPr lang="fr-FR" sz="3600" dirty="0"/>
+                          </a:p>
+                          <a:p>
+                            <a:pPr algn="ctr"/>
+                            <a:r>
+                              <a:rPr lang="fr-FR" sz="3600" b="1" dirty="0" smtClean="0"/>
+                              <a:t>Transfer</a:t>
+                            </a:r>
+                            <a:endParaRPr lang="fr-FR" sz="3600" b="1" dirty="0" smtClean="0"/>
                           </a:p>
                         </p:txBody>
                       </p:sp>
@@ -6920,12 +6474,20 @@
                 </a:p>
                 <a:p>
                   <a:r>
+                    <a:rPr lang="fr-FR" sz="3600" dirty="0" smtClean="0">
+                      <a:solidFill>
+                        <a:schemeClr val="tx1"/>
+                      </a:solidFill>
+                    </a:rPr>
+                    <a:t>Horizontal </a:t>
+                  </a:r>
+                  <a:r>
                     <a:rPr lang="fr-FR" sz="3600" dirty="0">
                       <a:solidFill>
                         <a:schemeClr val="tx1"/>
                       </a:solidFill>
                     </a:rPr>
-                    <a:t>Horizontal Gene Transfer </a:t>
+                    <a:t>Gene Transfer </a:t>
                   </a:r>
                   <a:r>
                     <a:rPr lang="fr-FR" sz="3600" dirty="0">
@@ -6995,8 +6557,8 @@
               </p:nvSpPr>
               <p:spPr>
                 <a:xfrm>
-                  <a:off x="12158862" y="22322075"/>
-                  <a:ext cx="9194645" cy="2877454"/>
+                  <a:off x="12015028" y="22364995"/>
+                  <a:ext cx="8312858" cy="2877454"/>
                 </a:xfrm>
                 <a:prstGeom prst="roundRect">
                   <a:avLst>
@@ -7064,8 +6626,29 @@
                         <a:schemeClr val="tx1"/>
                       </a:solidFill>
                     </a:rPr>
-                    <a:t> in production steps</a:t>
+                    <a:t> </a:t>
                   </a:r>
+                  <a:r>
+                    <a:rPr lang="fr-FR" sz="3600" b="1" dirty="0" smtClean="0">
+                      <a:solidFill>
+                        <a:schemeClr val="tx1"/>
+                      </a:solidFill>
+                    </a:rPr>
+                    <a:t>in</a:t>
+                  </a:r>
+                  <a:r>
+                    <a:rPr lang="fr-FR" sz="3600" b="1" dirty="0" smtClean="0">
+                      <a:solidFill>
+                        <a:schemeClr val="tx1"/>
+                      </a:solidFill>
+                    </a:rPr>
+                    <a:t> processing</a:t>
+                  </a:r>
+                  <a:endParaRPr lang="fr-FR" sz="3600" b="1" dirty="0">
+                    <a:solidFill>
+                      <a:schemeClr val="tx1"/>
+                    </a:solidFill>
+                  </a:endParaRPr>
                 </a:p>
                 <a:p>
                   <a:pPr>
@@ -7081,15 +6664,25 @@
                         </a:schemeClr>
                       </a:solidFill>
                     </a:rPr>
-                    <a:t>Collineau et al. (2020) </a:t>
+                    <a:t>Collineau et al. (2020</a:t>
                   </a:r>
                   <a:r>
-                    <a:rPr lang="fr-FR" sz="3600" dirty="0">
+                    <a:rPr lang="fr-FR" sz="3600" dirty="0" smtClean="0">
+                      <a:solidFill>
+                        <a:schemeClr val="accent1">
+                          <a:lumMod val="50000"/>
+                        </a:schemeClr>
+                      </a:solidFill>
+                    </a:rPr>
+                    <a:t>)</a:t>
+                  </a:r>
+                  <a:r>
+                    <a:rPr lang="fr-FR" sz="3600" dirty="0" smtClean="0">
                       <a:solidFill>
                         <a:schemeClr val="tx1"/>
                       </a:solidFill>
                     </a:rPr>
-                    <a:t>adapted to ESBL </a:t>
+                    <a:t> in ESBL </a:t>
                   </a:r>
                   <a:r>
                     <a:rPr lang="fr-FR" sz="3600" i="1" dirty="0">
@@ -7107,6 +6700,19 @@
                     </a:rPr>
                     <a:t> </a:t>
                   </a:r>
+                  <a:r>
+                    <a:rPr lang="fr-FR" sz="3600" dirty="0" smtClean="0">
+                      <a:solidFill>
+                        <a:schemeClr val="tx1"/>
+                      </a:solidFill>
+                    </a:rPr>
+                    <a:t>setup</a:t>
+                  </a:r>
+                  <a:endParaRPr lang="fr-FR" sz="3600" dirty="0">
+                    <a:solidFill>
+                      <a:schemeClr val="tx1"/>
+                    </a:solidFill>
+                  </a:endParaRPr>
                 </a:p>
                 <a:p>
                   <a:r>
@@ -7136,36 +6742,12 @@
                 </a:p>
                 <a:p>
                   <a:r>
-                    <a:rPr lang="fr-FR" sz="3600" dirty="0">
-                      <a:solidFill>
-                        <a:schemeClr val="tx1"/>
-                      </a:solidFill>
-                    </a:rPr>
-                    <a:t>The food-borne </a:t>
-                  </a:r>
-                  <a:r>
                     <a:rPr lang="fr-FR" sz="3600" dirty="0" smtClean="0">
                       <a:solidFill>
                         <a:schemeClr val="tx1"/>
                       </a:solidFill>
                     </a:rPr>
-                    <a:t>module </a:t>
-                  </a:r>
-                  <a:r>
-                    <a:rPr lang="fr-FR" sz="3600" dirty="0">
-                      <a:solidFill>
-                        <a:schemeClr val="tx1"/>
-                      </a:solidFill>
-                    </a:rPr>
-                    <a:t>replicates each </a:t>
-                  </a:r>
-                  <a:r>
-                    <a:rPr lang="fr-FR" sz="3600" dirty="0" smtClean="0">
-                      <a:solidFill>
-                        <a:schemeClr val="tx1"/>
-                      </a:solidFill>
-                    </a:rPr>
-                    <a:t>step</a:t>
+                    <a:t>Simulates the processing of 1 chicken flock</a:t>
                   </a:r>
                   <a:endParaRPr lang="fr-FR" sz="3600" dirty="0">
                     <a:solidFill>
@@ -7187,8 +6769,8 @@
               </p:nvSpPr>
               <p:spPr>
                 <a:xfrm>
-                  <a:off x="21775777" y="22313127"/>
-                  <a:ext cx="7424557" cy="2886402"/>
+                  <a:off x="20506336" y="22375030"/>
+                  <a:ext cx="8705901" cy="2886402"/>
                 </a:xfrm>
                 <a:prstGeom prst="roundRect">
                   <a:avLst>
@@ -7235,30 +6817,56 @@
                     </a:lnSpc>
                   </a:pPr>
                   <a:r>
+                    <a:rPr lang="fr-FR" sz="3600" b="1" dirty="0" smtClean="0">
+                      <a:solidFill>
+                        <a:schemeClr val="tx1"/>
+                      </a:solidFill>
+                    </a:rPr>
+                    <a:t>Flock </a:t>
+                  </a:r>
+                  <a:r>
+                    <a:rPr lang="fr-FR" sz="3600" b="1" dirty="0" smtClean="0">
+                      <a:solidFill>
+                        <a:schemeClr val="tx1"/>
+                      </a:solidFill>
+                    </a:rPr>
+                    <a:t>Risk </a:t>
+                  </a:r>
+                  <a:r>
                     <a:rPr lang="fr-FR" sz="3600" b="1" dirty="0">
                       <a:solidFill>
                         <a:schemeClr val="tx1"/>
                       </a:solidFill>
                     </a:rPr>
-                    <a:t>Risk from 1 chicken portion</a:t>
+                    <a:t>from 1 chicken </a:t>
                   </a:r>
-                  <a:br>
-                    <a:rPr lang="fr-FR" sz="3600" b="1" dirty="0">
+                  <a:r>
+                    <a:rPr lang="fr-FR" sz="3600" b="1" dirty="0" smtClean="0">
                       <a:solidFill>
                         <a:schemeClr val="tx1"/>
                       </a:solidFill>
                     </a:rPr>
-                  </a:br>
+                    <a:t>portion consumed</a:t>
+                  </a:r>
+                </a:p>
+                <a:p>
+                  <a:pPr marL="571500" indent="-571500">
+                    <a:lnSpc>
+                      <a:spcPct val="150000"/>
+                    </a:lnSpc>
+                    <a:buFont typeface="Arial" panose="020B0604020202020204" pitchFamily="34" charset="0"/>
+                    <a:buChar char="•"/>
+                  </a:pPr>
                   <a:r>
-                    <a:rPr lang="fr-FR" sz="3600" dirty="0">
+                    <a:rPr lang="fr-FR" sz="3600" dirty="0" smtClean="0">
                       <a:solidFill>
                         <a:schemeClr val="tx1"/>
                       </a:solidFill>
                     </a:rPr>
-                    <a:t>Probability of ESBL </a:t>
+                    <a:t>Prob. of ESBL </a:t>
                   </a:r>
                   <a:r>
-                    <a:rPr lang="fr-FR" sz="3600" i="1" dirty="0">
+                    <a:rPr lang="fr-FR" sz="3600" i="1" dirty="0" smtClean="0">
                       <a:solidFill>
                         <a:schemeClr val="tx1"/>
                       </a:solidFill>
@@ -7266,35 +6874,140 @@
                     <a:t>E. coli </a:t>
                   </a:r>
                   <a:r>
-                    <a:rPr lang="fr-FR" sz="3600" dirty="0">
+                    <a:rPr lang="fr-FR" sz="3600" dirty="0" smtClean="0">
                       <a:solidFill>
                         <a:srgbClr val="FF0000"/>
                       </a:solidFill>
                     </a:rPr>
-                    <a:t>carriership</a:t>
+                    <a:t>carriage by consumer</a:t>
                   </a:r>
                 </a:p>
                 <a:p>
+                  <a:pPr marL="571500" indent="-571500">
+                    <a:buFont typeface="Arial" panose="020B0604020202020204" pitchFamily="34" charset="0"/>
+                    <a:buChar char="•"/>
+                  </a:pPr>
+                  <a:r>
+                    <a:rPr lang="fr-FR" sz="3600" dirty="0" smtClean="0">
+                      <a:solidFill>
+                        <a:schemeClr val="tx1"/>
+                      </a:solidFill>
+                    </a:rPr>
+                    <a:t>Conditional </a:t>
+                  </a:r>
                   <a:r>
                     <a:rPr lang="fr-FR" sz="3600" dirty="0">
                       <a:solidFill>
                         <a:schemeClr val="tx1"/>
                       </a:solidFill>
                     </a:rPr>
-                    <a:t>Conditional on final Prevalence, Load</a:t>
+                    <a:t>on </a:t>
                   </a:r>
-                </a:p>
-                <a:p>
                   <a:r>
-                    <a:rPr lang="fr-FR" sz="3600" dirty="0">
+                    <a:rPr lang="fr-FR" sz="3600" dirty="0" smtClean="0">
                       <a:solidFill>
                         <a:srgbClr val="FF0000"/>
                       </a:solidFill>
                     </a:rPr>
-                    <a:t>Dose-response</a:t>
+                    <a:t>P</a:t>
+                  </a:r>
+                  <a:r>
+                    <a:rPr lang="fr-FR" sz="2400" dirty="0" smtClean="0">
+                      <a:solidFill>
+                        <a:srgbClr val="FF0000"/>
+                      </a:solidFill>
+                    </a:rPr>
+                    <a:t>prev</a:t>
+                  </a:r>
+                  <a:r>
+                    <a:rPr lang="fr-FR" sz="3600" dirty="0" smtClean="0">
+                      <a:solidFill>
+                        <a:schemeClr val="tx1"/>
+                      </a:solidFill>
+                    </a:rPr>
+                    <a:t>, </a:t>
+                  </a:r>
+                  <a:r>
+                    <a:rPr lang="fr-FR" sz="3600" dirty="0" smtClean="0">
+                      <a:solidFill>
+                        <a:srgbClr val="FF0000"/>
+                      </a:solidFill>
+                    </a:rPr>
+                    <a:t>C</a:t>
+                  </a:r>
+                  <a:r>
+                    <a:rPr lang="fr-FR" sz="2400" dirty="0" smtClean="0">
+                      <a:solidFill>
+                        <a:srgbClr val="FF0000"/>
+                      </a:solidFill>
+                    </a:rPr>
+                    <a:t>load </a:t>
+                  </a:r>
+                  <a:r>
+                    <a:rPr lang="fr-FR" sz="3600" dirty="0" smtClean="0">
+                      <a:solidFill>
+                        <a:schemeClr val="tx1"/>
+                      </a:solidFill>
+                    </a:rPr>
+                    <a:t>after cooking</a:t>
+                  </a:r>
+                  <a:endParaRPr lang="fr-FR" sz="3600" dirty="0">
+                    <a:solidFill>
+                      <a:schemeClr val="tx1"/>
+                    </a:solidFill>
+                  </a:endParaRPr>
+                </a:p>
+                <a:p>
+                  <a:r>
+                    <a:rPr lang="fr-FR" sz="3600" dirty="0" smtClean="0">
+                      <a:solidFill>
+                        <a:schemeClr val="tx1"/>
+                      </a:solidFill>
+                    </a:rPr>
+                    <a:t>P</a:t>
+                  </a:r>
+                  <a:r>
+                    <a:rPr lang="fr-FR" sz="2400" dirty="0" smtClean="0">
+                      <a:solidFill>
+                        <a:schemeClr val="tx1"/>
+                      </a:solidFill>
+                    </a:rPr>
+                    <a:t>DR</a:t>
+                  </a:r>
+                  <a:r>
+                    <a:rPr lang="fr-FR" sz="2400" dirty="0">
+                      <a:solidFill>
+                        <a:schemeClr val="tx1"/>
+                      </a:solidFill>
+                    </a:rPr>
+                    <a:t> </a:t>
                   </a:r>
                   <a:r>
                     <a:rPr lang="fr-FR" sz="3600" dirty="0">
+                      <a:solidFill>
+                        <a:schemeClr val="tx1"/>
+                      </a:solidFill>
+                    </a:rPr>
+                    <a:t>:</a:t>
+                  </a:r>
+                  <a:r>
+                    <a:rPr lang="fr-FR" sz="2400" dirty="0" smtClean="0">
+                      <a:solidFill>
+                        <a:schemeClr val="tx1"/>
+                      </a:solidFill>
+                    </a:rPr>
+                    <a:t> </a:t>
+                  </a:r>
+                  <a:r>
+                    <a:rPr lang="fr-FR" sz="3600" dirty="0" smtClean="0">
+                      <a:solidFill>
+                        <a:srgbClr val="FF0000"/>
+                      </a:solidFill>
+                    </a:rPr>
+                    <a:t>Dose-Response</a:t>
+                  </a:r>
+                  <a:r>
+                    <a:rPr lang="fr-FR" sz="3600" dirty="0" smtClean="0">
                       <a:solidFill>
                         <a:schemeClr val="tx1"/>
                       </a:solidFill>
@@ -7329,7 +7042,7 @@
         </p:nvGrpSpPr>
         <p:grpSpPr>
           <a:xfrm>
-            <a:off x="1272415" y="25970475"/>
+            <a:off x="1171610" y="25933049"/>
             <a:ext cx="12185456" cy="6793308"/>
             <a:chOff x="1129491" y="26032079"/>
             <a:chExt cx="12327709" cy="7002845"/>
@@ -7424,7 +7137,7 @@
         </p:nvGrpSpPr>
         <p:grpSpPr>
           <a:xfrm>
-            <a:off x="1275777" y="33144610"/>
+            <a:off x="1171610" y="33162652"/>
             <a:ext cx="12124004" cy="6842025"/>
             <a:chOff x="1228314" y="33225958"/>
             <a:chExt cx="12124004" cy="6842025"/>
@@ -7511,8 +7224,8 @@
           </p:txBody>
         </p:sp>
       </p:grpSp>
-      <mc:AlternateContent xmlns:mc="http://schemas.openxmlformats.org/markup-compatibility/2006" xmlns:a14="http://schemas.microsoft.com/office/drawing/2010/main">
-        <mc:Choice Requires="a14">
+      <mc:AlternateContent xmlns:mc="http://schemas.openxmlformats.org/markup-compatibility/2006">
+        <mc:Choice xmlns:a14="http://schemas.microsoft.com/office/drawing/2010/main" Requires="a14">
           <p:sp>
             <p:nvSpPr>
               <p:cNvPr id="138" name="Rectangle à coins arrondis 137"/>
@@ -7521,8 +7234,8 @@
             </p:nvSpPr>
             <p:spPr>
               <a:xfrm>
-                <a:off x="14031552" y="25988888"/>
-                <a:ext cx="15333398" cy="3847390"/>
+                <a:off x="13362085" y="25944218"/>
+                <a:ext cx="15960511" cy="3847390"/>
               </a:xfrm>
               <a:prstGeom prst="roundRect">
                 <a:avLst>
@@ -7569,15 +7282,56 @@
                       <a:schemeClr val="tx1"/>
                     </a:solidFill>
                   </a:rPr>
-                  <a:t>Computation of average risk of carriership</a:t>
+                  <a:t>Average risk of </a:t>
                 </a:r>
-              </a:p>
-              <a:p>
-                <a:pPr>
-                  <a:lnSpc>
-                    <a:spcPct val="200000"/>
-                  </a:lnSpc>
-                </a:pPr>
+                <a:r>
+                  <a:rPr lang="fr-FR" sz="3600" dirty="0">
+                    <a:solidFill>
+                      <a:schemeClr val="tx1"/>
+                    </a:solidFill>
+                  </a:rPr>
+                  <a:t>ESBL </a:t>
+                </a:r>
+                <a:r>
+                  <a:rPr lang="fr-FR" sz="3600" i="1" dirty="0">
+                    <a:solidFill>
+                      <a:schemeClr val="tx1"/>
+                    </a:solidFill>
+                  </a:rPr>
+                  <a:t>E. coli</a:t>
+                </a:r>
+                <a:r>
+                  <a:rPr lang="fr-FR" sz="3600" b="1" dirty="0" smtClean="0">
+                    <a:solidFill>
+                      <a:schemeClr val="tx1"/>
+                    </a:solidFill>
+                  </a:rPr>
+                  <a:t> carriage by consumer</a:t>
+                </a:r>
+                <a:r>
+                  <a:rPr lang="fr-FR" sz="3600" b="1" dirty="0" smtClean="0">
+                    <a:solidFill>
+                      <a:schemeClr val="tx1"/>
+                    </a:solidFill>
+                  </a:rPr>
+                  <a:t> </a:t>
+                </a:r>
+                <a:r>
+                  <a:rPr lang="fr-FR" sz="3600" b="1" dirty="0">
+                    <a:solidFill>
+                      <a:schemeClr val="tx1"/>
+                    </a:solidFill>
+                  </a:rPr>
+                  <a:t>from 1 chicken portion </a:t>
+                </a:r>
+                <a:r>
+                  <a:rPr lang="fr-FR" sz="3600" b="1" dirty="0" smtClean="0">
+                    <a:solidFill>
+                      <a:schemeClr val="tx1"/>
+                    </a:solidFill>
+                  </a:rPr>
+                  <a:t>consumed </a:t>
+                </a:r>
                 <a:r>
                   <a:rPr lang="fr-FR" sz="3600" b="1" dirty="0">
                     <a:solidFill>
@@ -7596,7 +7350,7 @@
                 </a:r>
                 <a14:m>
                   <m:oMath xmlns:m="http://schemas.openxmlformats.org/officeDocument/2006/math">
-                    <a:fld id="{723DAD93-1269-4C4D-8526-7226BAC1BC1F}" type="mathplaceholder">
+                    <a:fld id="{A6AC258B-BBF2-40CF-B999-D86047CA68F5}" type="mathplaceholder">
                       <a:rPr lang="fr-FR" sz="3600" i="1">
                         <a:latin typeface="Cambria Math" panose="02040503050406030204" pitchFamily="18" charset="0"/>
                       </a:rPr>
@@ -7647,15 +7401,7 @@
                       <a:schemeClr val="tx1"/>
                     </a:solidFill>
                   </a:rPr>
-                  <a:t>Average risk of ESBL </a:t>
-                </a:r>
-                <a:r>
-                  <a:rPr lang="fr-FR" sz="3600" i="1" dirty="0" smtClean="0">
-                    <a:solidFill>
-                      <a:schemeClr val="tx1"/>
-                    </a:solidFill>
-                  </a:rPr>
-                  <a:t>E. coli </a:t>
+                  <a:t>Average </a:t>
                 </a:r>
                 <a:r>
                   <a:rPr lang="fr-FR" sz="3600" dirty="0" smtClean="0">
@@ -7663,7 +7409,7 @@
                       <a:schemeClr val="tx1"/>
                     </a:solidFill>
                   </a:rPr>
-                  <a:t> carriership </a:t>
+                  <a:t>risk </a:t>
                 </a:r>
                 <a:r>
                   <a:rPr lang="fr-FR" sz="3600" dirty="0">
@@ -7671,7 +7417,25 @@
                       <a:schemeClr val="tx1"/>
                     </a:solidFill>
                   </a:rPr>
-                  <a:t>in a baseline </a:t>
+                  <a:t>in a </a:t>
+                </a:r>
+                <a:r>
+                  <a:rPr lang="fr-FR" sz="3600" dirty="0">
+                    <a:solidFill>
+                      <a:schemeClr val="accent1">
+                        <a:lumMod val="50000"/>
+                      </a:schemeClr>
+                    </a:solidFill>
+                  </a:rPr>
+                  <a:t>baseline</a:t>
+                </a:r>
+                <a:r>
+                  <a:rPr lang="fr-FR" sz="3600" dirty="0">
+                    <a:solidFill>
+                      <a:schemeClr val="tx1"/>
+                    </a:solidFill>
+                  </a:rPr>
+                  <a:t> scenario </a:t>
                 </a:r>
                 <a:r>
                   <a:rPr lang="fr-FR" sz="3600" dirty="0" smtClean="0">
@@ -7679,7 +7443,15 @@
                       <a:schemeClr val="tx1"/>
                     </a:solidFill>
                   </a:rPr>
-                  <a:t>scenario: </a:t>
+                  <a:t>defined by input parameters Ɵ </a:t>
+                </a:r>
+                <a:r>
+                  <a:rPr lang="fr-FR" sz="3600" dirty="0">
+                    <a:solidFill>
+                      <a:schemeClr val="tx1"/>
+                    </a:solidFill>
+                  </a:rPr>
+                  <a:t>: </a:t>
                 </a:r>
                 <a:r>
                   <a:rPr lang="fr-FR" sz="3600" dirty="0" smtClean="0">
@@ -7704,7 +7476,7 @@
             </p:txBody>
           </p:sp>
         </mc:Choice>
-        <mc:Fallback xmlns="">
+        <mc:Fallback>
           <p:sp>
             <p:nvSpPr>
               <p:cNvPr id="138" name="Rectangle à coins arrondis 137"/>
@@ -7715,8 +7487,8 @@
             </p:nvSpPr>
             <p:spPr>
               <a:xfrm>
-                <a:off x="14031552" y="25988888"/>
-                <a:ext cx="15333398" cy="3847390"/>
+                <a:off x="13362085" y="25944218"/>
+                <a:ext cx="15960511" cy="3847390"/>
               </a:xfrm>
               <a:prstGeom prst="roundRect">
                 <a:avLst>
@@ -7726,7 +7498,7 @@
               <a:blipFill>
                 <a:blip r:embed="rId21"/>
                 <a:stretch>
-                  <a:fillRect l="-555"/>
+                  <a:fillRect l="-495" r="-1029"/>
                 </a:stretch>
               </a:blipFill>
               <a:ln w="38100">
@@ -7760,8 +7532,8 @@
         </p:nvSpPr>
         <p:spPr>
           <a:xfrm>
-            <a:off x="13988774" y="37017747"/>
-            <a:ext cx="15333398" cy="2905068"/>
+            <a:off x="13357067" y="37017747"/>
+            <a:ext cx="15965106" cy="2905068"/>
           </a:xfrm>
           <a:prstGeom prst="roundRect">
             <a:avLst>
@@ -7813,7 +7585,23 @@
                   <a:schemeClr val="tx1"/>
                 </a:solidFill>
               </a:rPr>
-              <a:t>Food-borne QRA model perspectives</a:t>
+              <a:t>Food-borne QRA </a:t>
+            </a:r>
+            <a:r>
+              <a:rPr lang="fr-FR" sz="3600" b="1" dirty="0" smtClean="0">
+                <a:solidFill>
+                  <a:schemeClr val="tx1"/>
+                </a:solidFill>
+              </a:rPr>
+              <a:t>module </a:t>
+            </a:r>
+            <a:r>
+              <a:rPr lang="fr-FR" sz="3600" b="1" dirty="0" smtClean="0">
+                <a:solidFill>
+                  <a:schemeClr val="tx1"/>
+                </a:solidFill>
+              </a:rPr>
+              <a:t>perspectives</a:t>
             </a:r>
             <a:endParaRPr lang="fr-FR" sz="3600" b="1" dirty="0">
               <a:solidFill>
@@ -7877,7 +7665,23 @@
                   <a:schemeClr val="tx1"/>
                 </a:solidFill>
               </a:rPr>
-              <a:t>nput parameters can be adapted to different </a:t>
+              <a:t>nput parameters </a:t>
+            </a:r>
+            <a:r>
+              <a:rPr lang="fr-FR" sz="3600" dirty="0">
+                <a:solidFill>
+                  <a:schemeClr val="tx1"/>
+                </a:solidFill>
+              </a:rPr>
+              <a:t>Ɵ can </a:t>
+            </a:r>
+            <a:r>
+              <a:rPr lang="fr-FR" sz="3600" dirty="0" smtClean="0">
+                <a:solidFill>
+                  <a:schemeClr val="tx1"/>
+                </a:solidFill>
+              </a:rPr>
+              <a:t>be adapted to different </a:t>
             </a:r>
             <a:r>
               <a:rPr lang="fr-FR" sz="3600" dirty="0" smtClean="0">
@@ -7893,7 +7697,15 @@
                   <a:schemeClr val="tx1"/>
                 </a:solidFill>
               </a:rPr>
-              <a:t> country framework</a:t>
+              <a:t> </a:t>
+            </a:r>
+            <a:r>
+              <a:rPr lang="fr-FR" sz="3600" dirty="0" smtClean="0">
+                <a:solidFill>
+                  <a:schemeClr val="tx1"/>
+                </a:solidFill>
+              </a:rPr>
+              <a:t>country protocols</a:t>
             </a:r>
             <a:endParaRPr lang="fr-FR" sz="3600" dirty="0" smtClean="0">
               <a:solidFill>
@@ -7935,7 +7747,7 @@
         </p:nvGrpSpPr>
         <p:grpSpPr>
           <a:xfrm>
-            <a:off x="14031552" y="30056373"/>
+            <a:off x="13642236" y="30021311"/>
             <a:ext cx="12601099" cy="6719777"/>
             <a:chOff x="13988365" y="29702382"/>
             <a:chExt cx="12601099" cy="6719777"/>
@@ -8022,420 +7834,929 @@
           </p:txBody>
         </p:sp>
       </p:grpSp>
-      <p:sp>
-        <p:nvSpPr>
-          <p:cNvPr id="60" name="Rectangle à coins arrondis 59"/>
-          <p:cNvSpPr/>
+      <p:grpSp>
+        <p:nvGrpSpPr>
+          <p:cNvPr id="18" name="Groupe 17"/>
+          <p:cNvGrpSpPr/>
           <p:nvPr/>
-        </p:nvSpPr>
-        <p:spPr>
+        </p:nvGrpSpPr>
+        <p:grpSpPr>
           <a:xfrm>
-            <a:off x="1345991" y="8058738"/>
-            <a:ext cx="15555472" cy="5740062"/>
+            <a:off x="1111654" y="7778554"/>
+            <a:ext cx="28051903" cy="6017392"/>
+            <a:chOff x="1111654" y="7778554"/>
+            <a:chExt cx="28051903" cy="6017392"/>
           </a:xfrm>
-          <a:prstGeom prst="roundRect">
-            <a:avLst>
-              <a:gd name="adj" fmla="val 4812"/>
-            </a:avLst>
-          </a:prstGeom>
-          <a:solidFill>
-            <a:schemeClr val="accent1">
-              <a:lumMod val="40000"/>
-              <a:lumOff val="60000"/>
-            </a:schemeClr>
-          </a:solidFill>
-          <a:ln w="38100">
-            <a:solidFill>
-              <a:schemeClr val="accent1">
-                <a:lumMod val="50000"/>
-              </a:schemeClr>
-            </a:solidFill>
-          </a:ln>
-        </p:spPr>
-        <p:style>
-          <a:lnRef idx="2">
-            <a:schemeClr val="accent1">
-              <a:shade val="50000"/>
-            </a:schemeClr>
-          </a:lnRef>
-          <a:fillRef idx="1">
-            <a:schemeClr val="accent1"/>
-          </a:fillRef>
-          <a:effectRef idx="0">
-            <a:schemeClr val="accent1"/>
-          </a:effectRef>
-          <a:fontRef idx="minor">
-            <a:schemeClr val="lt1"/>
-          </a:fontRef>
-        </p:style>
-        <p:txBody>
-          <a:bodyPr rtlCol="0" anchor="ctr"/>
-          <a:lstStyle/>
-          <a:p>
-            <a:pPr>
-              <a:lnSpc>
-                <a:spcPct val="150000"/>
-              </a:lnSpc>
-            </a:pPr>
-            <a:r>
-              <a:rPr lang="fr-FR" sz="3600" b="1" dirty="0">
-                <a:solidFill>
-                  <a:schemeClr val="tx1"/>
-                </a:solidFill>
-              </a:rPr>
-              <a:t>PROJECT ENVIRE</a:t>
-            </a:r>
-          </a:p>
-          <a:p>
-            <a:pPr algn="ctr">
-              <a:lnSpc>
-                <a:spcPct val="150000"/>
-              </a:lnSpc>
-            </a:pPr>
-            <a:r>
-              <a:rPr lang="fr-FR" sz="3600" b="1" dirty="0">
-                <a:solidFill>
-                  <a:schemeClr val="tx1"/>
-                </a:solidFill>
-              </a:rPr>
-              <a:t>CONSORTIUM AND FUNDING</a:t>
-            </a:r>
-            <a:endParaRPr lang="en-US" sz="3600" dirty="0">
+        </p:grpSpPr>
+        <p:pic>
+          <p:nvPicPr>
+            <p:cNvPr id="110" name="Image 109"/>
+            <p:cNvPicPr>
+              <a:picLocks noChangeAspect="1"/>
+            </p:cNvPicPr>
+            <p:nvPr/>
+          </p:nvPicPr>
+          <p:blipFill>
+            <a:blip r:embed="rId8" cstate="print">
+              <a:extLst>
+                <a:ext uri="{28A0092B-C50C-407E-A947-70E740481C1C}">
+                  <a14:useLocalDpi xmlns:a14="http://schemas.microsoft.com/office/drawing/2010/main" val="0"/>
+                </a:ext>
+              </a:extLst>
+            </a:blip>
+            <a:stretch>
+              <a:fillRect/>
+            </a:stretch>
+          </p:blipFill>
+          <p:spPr>
+            <a:xfrm>
+              <a:off x="27968516" y="9476201"/>
+              <a:ext cx="727780" cy="727780"/>
+            </a:xfrm>
+            <a:prstGeom prst="rect">
+              <a:avLst/>
+            </a:prstGeom>
+          </p:spPr>
+        </p:pic>
+        <p:grpSp>
+          <p:nvGrpSpPr>
+            <p:cNvPr id="12" name="Groupe 11"/>
+            <p:cNvGrpSpPr/>
+            <p:nvPr/>
+          </p:nvGrpSpPr>
+          <p:grpSpPr>
+            <a:xfrm>
+              <a:off x="1111654" y="7778554"/>
+              <a:ext cx="28051903" cy="6017392"/>
+              <a:chOff x="1081364" y="7970949"/>
+              <a:chExt cx="28051903" cy="6017392"/>
+            </a:xfrm>
+          </p:grpSpPr>
+          <p:grpSp>
+            <p:nvGrpSpPr>
+              <p:cNvPr id="33" name="Groupe 32"/>
+              <p:cNvGrpSpPr/>
+              <p:nvPr/>
+            </p:nvGrpSpPr>
+            <p:grpSpPr>
+              <a:xfrm>
+                <a:off x="19658021" y="8079031"/>
+                <a:ext cx="9405669" cy="5909310"/>
+                <a:chOff x="19897835" y="8079031"/>
+                <a:chExt cx="9405669" cy="5909310"/>
+              </a:xfrm>
+            </p:grpSpPr>
+            <p:sp>
+              <p:nvSpPr>
+                <p:cNvPr id="24" name="ZoneTexte 23"/>
+                <p:cNvSpPr txBox="1"/>
+                <p:nvPr/>
+              </p:nvSpPr>
+              <p:spPr>
+                <a:xfrm>
+                  <a:off x="19897835" y="8079031"/>
+                  <a:ext cx="9405669" cy="5909310"/>
+                </a:xfrm>
+                <a:prstGeom prst="rect">
+                  <a:avLst/>
+                </a:prstGeom>
+                <a:noFill/>
+              </p:spPr>
+              <p:txBody>
+                <a:bodyPr wrap="square" rtlCol="0">
+                  <a:spAutoFit/>
+                </a:bodyPr>
+                <a:lstStyle/>
+                <a:p>
+                  <a:pPr>
+                    <a:lnSpc>
+                      <a:spcPct val="150000"/>
+                    </a:lnSpc>
+                  </a:pPr>
+                  <a:r>
+                    <a:rPr lang="fr-FR" sz="3600" b="1" dirty="0" smtClean="0"/>
+                    <a:t>WORKFLOW – WP 3</a:t>
+                  </a:r>
+                </a:p>
+                <a:p>
+                  <a:pPr marL="571500" indent="-571500">
+                    <a:buFont typeface="Arial" panose="020B0604020202020204" pitchFamily="34" charset="0"/>
+                    <a:buChar char="•"/>
+                  </a:pPr>
+                  <a:r>
+                    <a:rPr lang="fr-FR" sz="3600" dirty="0"/>
+                    <a:t>Quantitative Risk </a:t>
+                  </a:r>
+                  <a:r>
+                    <a:rPr lang="fr-FR" sz="3600" dirty="0" smtClean="0"/>
+                    <a:t>Assessment with pathways:</a:t>
+                  </a:r>
+                </a:p>
+                <a:p>
+                  <a:pPr marL="571500" indent="-571500">
+                    <a:buFont typeface="Arial" panose="020B0604020202020204" pitchFamily="34" charset="0"/>
+                    <a:buChar char="•"/>
+                  </a:pPr>
+                  <a:endParaRPr lang="fr-FR" sz="3600" dirty="0" smtClean="0"/>
+                </a:p>
+                <a:p>
+                  <a:pPr marL="571500" indent="-571500">
+                    <a:buFont typeface="Arial" panose="020B0604020202020204" pitchFamily="34" charset="0"/>
+                    <a:buChar char="•"/>
+                  </a:pPr>
+                  <a:endParaRPr lang="fr-FR" sz="3600" dirty="0"/>
+                </a:p>
+                <a:p>
+                  <a:pPr marL="571500" indent="-571500">
+                    <a:buFont typeface="Arial" panose="020B0604020202020204" pitchFamily="34" charset="0"/>
+                    <a:buChar char="•"/>
+                  </a:pPr>
+                  <a:endParaRPr lang="fr-FR" sz="3600" dirty="0" smtClean="0"/>
+                </a:p>
+                <a:p>
+                  <a:endParaRPr lang="fr-FR" sz="3600" dirty="0" smtClean="0"/>
+                </a:p>
+                <a:p>
+                  <a:pPr marL="571500" indent="-571500">
+                    <a:buFont typeface="Arial" panose="020B0604020202020204" pitchFamily="34" charset="0"/>
+                    <a:buChar char="•"/>
+                  </a:pPr>
+                  <a:endParaRPr lang="fr-FR" sz="3600" dirty="0"/>
+                </a:p>
+                <a:p>
+                  <a:pPr marL="571500" indent="-571500">
+                    <a:buFont typeface="Arial" panose="020B0604020202020204" pitchFamily="34" charset="0"/>
+                    <a:buChar char="•"/>
+                  </a:pPr>
+                  <a:endParaRPr lang="fr-FR" sz="3600" dirty="0" smtClean="0"/>
+                </a:p>
+                <a:p>
+                  <a:pPr marL="571500" indent="-571500">
+                    <a:buFont typeface="Arial" panose="020B0604020202020204" pitchFamily="34" charset="0"/>
+                    <a:buChar char="•"/>
+                  </a:pPr>
+                  <a:r>
+                    <a:rPr lang="fr-FR" sz="3600" dirty="0" err="1" smtClean="0"/>
+                    <a:t>Incorporate</a:t>
+                  </a:r>
+                  <a:r>
+                    <a:rPr lang="fr-FR" sz="3600" dirty="0" smtClean="0"/>
+                    <a:t> on-</a:t>
+                  </a:r>
+                  <a:r>
+                    <a:rPr lang="fr-FR" sz="3600" dirty="0" err="1" smtClean="0"/>
+                    <a:t>farm</a:t>
+                  </a:r>
+                  <a:r>
+                    <a:rPr lang="fr-FR" sz="3600" dirty="0" smtClean="0"/>
+                    <a:t> intervention </a:t>
+                  </a:r>
+                  <a:r>
+                    <a:rPr lang="fr-FR" sz="3600" dirty="0" err="1" smtClean="0"/>
+                    <a:t>measures</a:t>
+                  </a:r>
+                  <a:endParaRPr lang="fr-FR" sz="3600" dirty="0" smtClean="0"/>
+                </a:p>
+                <a:p>
+                  <a:pPr marL="571500" indent="-571500" algn="ctr">
+                    <a:buFont typeface="Arial" panose="020B0604020202020204" pitchFamily="34" charset="0"/>
+                    <a:buChar char="•"/>
+                  </a:pPr>
+                  <a:endParaRPr lang="fr-FR" sz="3600" dirty="0"/>
+                </a:p>
+              </p:txBody>
+            </p:sp>
+            <p:grpSp>
+              <p:nvGrpSpPr>
+                <p:cNvPr id="29" name="Groupe 28"/>
+                <p:cNvGrpSpPr/>
+                <p:nvPr/>
+              </p:nvGrpSpPr>
+              <p:grpSpPr>
+                <a:xfrm>
+                  <a:off x="21358589" y="9667497"/>
+                  <a:ext cx="6613452" cy="2872755"/>
+                  <a:chOff x="19206492" y="9824303"/>
+                  <a:chExt cx="6613452" cy="2872755"/>
+                </a:xfrm>
+              </p:grpSpPr>
+              <p:sp>
+                <p:nvSpPr>
+                  <p:cNvPr id="25" name="Rectangle à coins arrondis 24"/>
+                  <p:cNvSpPr/>
+                  <p:nvPr/>
+                </p:nvSpPr>
+                <p:spPr>
+                  <a:xfrm>
+                    <a:off x="19206492" y="9824303"/>
+                    <a:ext cx="6613451" cy="818255"/>
+                  </a:xfrm>
+                  <a:prstGeom prst="roundRect">
+                    <a:avLst/>
+                  </a:prstGeom>
+                  <a:solidFill>
+                    <a:schemeClr val="accent1">
+                      <a:lumMod val="40000"/>
+                      <a:lumOff val="60000"/>
+                    </a:schemeClr>
+                  </a:solidFill>
+                </p:spPr>
+                <p:style>
+                  <a:lnRef idx="2">
+                    <a:schemeClr val="accent1">
+                      <a:shade val="50000"/>
+                    </a:schemeClr>
+                  </a:lnRef>
+                  <a:fillRef idx="1">
+                    <a:schemeClr val="accent1"/>
+                  </a:fillRef>
+                  <a:effectRef idx="0">
+                    <a:schemeClr val="accent1"/>
+                  </a:effectRef>
+                  <a:fontRef idx="minor">
+                    <a:schemeClr val="lt1"/>
+                  </a:fontRef>
+                </p:style>
+                <p:txBody>
+                  <a:bodyPr rtlCol="0" anchor="ctr"/>
+                  <a:lstStyle/>
+                  <a:p>
+                    <a:pPr algn="ctr"/>
+                    <a:r>
+                      <a:rPr lang="fr-FR" sz="3600" dirty="0" smtClean="0">
+                        <a:solidFill>
+                          <a:schemeClr val="tx1"/>
+                        </a:solidFill>
+                      </a:rPr>
+                      <a:t>FOOD-BORNE</a:t>
+                    </a:r>
+                    <a:endParaRPr lang="fr-FR" sz="3600" dirty="0">
+                      <a:solidFill>
+                        <a:schemeClr val="tx1"/>
+                      </a:solidFill>
+                    </a:endParaRPr>
+                  </a:p>
+                </p:txBody>
+              </p:sp>
+              <p:sp>
+                <p:nvSpPr>
+                  <p:cNvPr id="26" name="Rectangle à coins arrondis 25"/>
+                  <p:cNvSpPr/>
+                  <p:nvPr/>
+                </p:nvSpPr>
+                <p:spPr>
+                  <a:xfrm>
+                    <a:off x="19206492" y="10831365"/>
+                    <a:ext cx="6613451" cy="818255"/>
+                  </a:xfrm>
+                  <a:prstGeom prst="roundRect">
+                    <a:avLst/>
+                  </a:prstGeom>
+                  <a:solidFill>
+                    <a:schemeClr val="accent1">
+                      <a:lumMod val="40000"/>
+                      <a:lumOff val="60000"/>
+                    </a:schemeClr>
+                  </a:solidFill>
+                </p:spPr>
+                <p:style>
+                  <a:lnRef idx="2">
+                    <a:schemeClr val="accent1">
+                      <a:shade val="50000"/>
+                    </a:schemeClr>
+                  </a:lnRef>
+                  <a:fillRef idx="1">
+                    <a:schemeClr val="accent1"/>
+                  </a:fillRef>
+                  <a:effectRef idx="0">
+                    <a:schemeClr val="accent1"/>
+                  </a:effectRef>
+                  <a:fontRef idx="minor">
+                    <a:schemeClr val="lt1"/>
+                  </a:fontRef>
+                </p:style>
+                <p:txBody>
+                  <a:bodyPr rtlCol="0" anchor="ctr"/>
+                  <a:lstStyle/>
+                  <a:p>
+                    <a:pPr algn="ctr"/>
+                    <a:r>
+                      <a:rPr lang="fr-FR" sz="3600" dirty="0" smtClean="0">
+                        <a:solidFill>
+                          <a:schemeClr val="tx1"/>
+                        </a:solidFill>
+                      </a:rPr>
+                      <a:t>ENVIRONMENTAL</a:t>
+                    </a:r>
+                    <a:endParaRPr lang="fr-FR" sz="3600" dirty="0">
+                      <a:solidFill>
+                        <a:schemeClr val="tx1"/>
+                      </a:solidFill>
+                    </a:endParaRPr>
+                  </a:p>
+                </p:txBody>
+              </p:sp>
+              <p:sp>
+                <p:nvSpPr>
+                  <p:cNvPr id="27" name="Rectangle à coins arrondis 26"/>
+                  <p:cNvSpPr/>
+                  <p:nvPr/>
+                </p:nvSpPr>
+                <p:spPr>
+                  <a:xfrm>
+                    <a:off x="19206493" y="11878803"/>
+                    <a:ext cx="6613451" cy="818255"/>
+                  </a:xfrm>
+                  <a:prstGeom prst="roundRect">
+                    <a:avLst/>
+                  </a:prstGeom>
+                  <a:solidFill>
+                    <a:schemeClr val="accent1">
+                      <a:lumMod val="40000"/>
+                      <a:lumOff val="60000"/>
+                    </a:schemeClr>
+                  </a:solidFill>
+                </p:spPr>
+                <p:style>
+                  <a:lnRef idx="2">
+                    <a:schemeClr val="accent1">
+                      <a:shade val="50000"/>
+                    </a:schemeClr>
+                  </a:lnRef>
+                  <a:fillRef idx="1">
+                    <a:schemeClr val="accent1"/>
+                  </a:fillRef>
+                  <a:effectRef idx="0">
+                    <a:schemeClr val="accent1"/>
+                  </a:effectRef>
+                  <a:fontRef idx="minor">
+                    <a:schemeClr val="lt1"/>
+                  </a:fontRef>
+                </p:style>
+                <p:txBody>
+                  <a:bodyPr rtlCol="0" anchor="ctr"/>
+                  <a:lstStyle/>
+                  <a:p>
+                    <a:pPr algn="ctr"/>
+                    <a:r>
+                      <a:rPr lang="fr-FR" sz="3600" dirty="0" smtClean="0">
+                        <a:solidFill>
+                          <a:schemeClr val="tx1"/>
+                        </a:solidFill>
+                      </a:rPr>
+                      <a:t>OCCUPATIONAL</a:t>
+                    </a:r>
+                    <a:endParaRPr lang="fr-FR" sz="3600" dirty="0">
+                      <a:solidFill>
+                        <a:schemeClr val="tx1"/>
+                      </a:solidFill>
+                    </a:endParaRPr>
+                  </a:p>
+                </p:txBody>
+              </p:sp>
+            </p:grpSp>
+          </p:grpSp>
+          <p:sp>
+            <p:nvSpPr>
+              <p:cNvPr id="28" name="Rectangle à coins arrondis 27"/>
+              <p:cNvSpPr/>
+              <p:nvPr/>
+            </p:nvSpPr>
+            <p:spPr>
+              <a:xfrm>
+                <a:off x="19415109" y="7970949"/>
+                <a:ext cx="9718158" cy="5762662"/>
+              </a:xfrm>
+              <a:prstGeom prst="roundRect">
+                <a:avLst>
+                  <a:gd name="adj" fmla="val 5309"/>
+                </a:avLst>
+              </a:prstGeom>
               <a:solidFill>
-                <a:schemeClr val="tx1"/>
+                <a:srgbClr val="5B9BD5">
+                  <a:alpha val="0"/>
+                </a:srgbClr>
               </a:solidFill>
-            </a:endParaRPr>
-          </a:p>
-          <a:p>
-            <a:pPr marL="571500" indent="-571500">
-              <a:buFont typeface="Arial" panose="020B0604020202020204" pitchFamily="34" charset="0"/>
-              <a:buChar char="•"/>
-            </a:pPr>
-            <a:r>
-              <a:rPr lang="fr-FR" sz="3600" dirty="0">
-                <a:solidFill>
-                  <a:schemeClr val="tx1"/>
-                </a:solidFill>
-              </a:rPr>
-              <a:t>Project duration: 2022-2025</a:t>
-            </a:r>
-          </a:p>
-          <a:p>
-            <a:pPr marL="571500" indent="-571500">
-              <a:buFont typeface="Arial" panose="020B0604020202020204" pitchFamily="34" charset="0"/>
-              <a:buChar char="•"/>
-            </a:pPr>
-            <a:r>
-              <a:rPr lang="en-US" sz="3600" dirty="0">
-                <a:solidFill>
-                  <a:schemeClr val="tx1"/>
-                </a:solidFill>
-              </a:rPr>
-              <a:t>Germany, France, Lithuania, Poland, Tunisia</a:t>
-            </a:r>
-            <a:endParaRPr lang="fr-FR" sz="3600" dirty="0">
-              <a:solidFill>
-                <a:schemeClr val="tx1"/>
-              </a:solidFill>
-            </a:endParaRPr>
-          </a:p>
-          <a:p>
-            <a:pPr marL="571500" indent="-571500">
-              <a:buFont typeface="Arial" panose="020B0604020202020204" pitchFamily="34" charset="0"/>
-              <a:buChar char="•"/>
-            </a:pPr>
-            <a:r>
-              <a:rPr lang="en-US" sz="3600" dirty="0">
-                <a:solidFill>
-                  <a:schemeClr val="tx1"/>
-                </a:solidFill>
-              </a:rPr>
-              <a:t>Funded by the European Transnational Programme - </a:t>
-            </a:r>
-            <a:r>
-              <a:rPr lang="fr-FR" sz="3600" dirty="0">
-                <a:solidFill>
-                  <a:srgbClr val="FF0000"/>
-                </a:solidFill>
-              </a:rPr>
-              <a:t>JPIAMR-ACTION</a:t>
-            </a:r>
-            <a:endParaRPr lang="en-US" sz="3600" dirty="0">
-              <a:solidFill>
-                <a:srgbClr val="FF0000"/>
-              </a:solidFill>
-            </a:endParaRPr>
-          </a:p>
-          <a:p>
-            <a:pPr algn="ctr"/>
-            <a:r>
-              <a:rPr lang="fr-FR" sz="3600" b="1" dirty="0">
-                <a:solidFill>
-                  <a:schemeClr val="tx1"/>
-                </a:solidFill>
-              </a:rPr>
-              <a:t>OBJECTIVES</a:t>
-            </a:r>
-          </a:p>
-          <a:p>
-            <a:pPr marL="571500" indent="-571500">
-              <a:buFont typeface="Arial" panose="020B0604020202020204" pitchFamily="34" charset="0"/>
-              <a:buChar char="•"/>
-            </a:pPr>
-            <a:r>
-              <a:rPr lang="en-US" sz="3600" dirty="0">
-                <a:solidFill>
-                  <a:schemeClr val="tx1"/>
-                </a:solidFill>
-              </a:rPr>
-              <a:t>Reduce antimicrobial-resistant (</a:t>
-            </a:r>
-            <a:r>
-              <a:rPr lang="en-US" sz="3600" dirty="0">
-                <a:solidFill>
-                  <a:srgbClr val="FF0000"/>
-                </a:solidFill>
-              </a:rPr>
-              <a:t>AMR</a:t>
-            </a:r>
-            <a:r>
-              <a:rPr lang="en-US" sz="3600" dirty="0">
-                <a:solidFill>
-                  <a:schemeClr val="tx1"/>
-                </a:solidFill>
-              </a:rPr>
-              <a:t>) bacteria spread from broiler chickens</a:t>
-            </a:r>
-          </a:p>
-          <a:p>
-            <a:pPr marL="571500" indent="-571500">
-              <a:buFont typeface="Arial" panose="020B0604020202020204" pitchFamily="34" charset="0"/>
-              <a:buChar char="•"/>
-            </a:pPr>
-            <a:r>
-              <a:rPr lang="en-US" sz="3600" dirty="0">
-                <a:solidFill>
-                  <a:schemeClr val="tx1"/>
-                </a:solidFill>
-              </a:rPr>
-              <a:t>Investigate the potential of various on-farm </a:t>
-            </a:r>
-            <a:r>
-              <a:rPr lang="en-US" sz="3600" dirty="0">
-                <a:solidFill>
-                  <a:srgbClr val="FF0000"/>
-                </a:solidFill>
-              </a:rPr>
-              <a:t>intervention</a:t>
-            </a:r>
-            <a:r>
-              <a:rPr lang="en-US" sz="3600" dirty="0">
-                <a:solidFill>
-                  <a:schemeClr val="tx1"/>
-                </a:solidFill>
-              </a:rPr>
-              <a:t> measures</a:t>
-            </a:r>
-          </a:p>
-          <a:p>
-            <a:pPr marL="571500" indent="-571500">
-              <a:buFont typeface="Arial" panose="020B0604020202020204" pitchFamily="34" charset="0"/>
-              <a:buChar char="•"/>
-            </a:pPr>
-            <a:r>
-              <a:rPr lang="en-US" sz="3600" dirty="0">
-                <a:solidFill>
-                  <a:schemeClr val="tx1"/>
-                </a:solidFill>
-              </a:rPr>
-              <a:t>Reduce transmission and human exposure to ESBL </a:t>
-            </a:r>
-            <a:r>
-              <a:rPr lang="en-US" sz="3600" i="1" dirty="0">
-                <a:solidFill>
-                  <a:schemeClr val="tx1"/>
-                </a:solidFill>
-              </a:rPr>
-              <a:t>E. Coli</a:t>
-            </a:r>
-            <a:r>
-              <a:rPr lang="en-US" sz="3600" dirty="0">
-                <a:solidFill>
-                  <a:schemeClr val="tx1"/>
-                </a:solidFill>
-              </a:rPr>
-              <a:t> from broiler chicken</a:t>
-            </a:r>
-          </a:p>
-          <a:p>
-            <a:pPr algn="ctr"/>
-            <a:endParaRPr lang="fr-FR" sz="3600" dirty="0">
-              <a:solidFill>
-                <a:schemeClr val="tx1"/>
-              </a:solidFill>
-            </a:endParaRPr>
-          </a:p>
-        </p:txBody>
-      </p:sp>
-      <p:sp>
-        <p:nvSpPr>
-          <p:cNvPr id="63" name="Rectangle 62"/>
-          <p:cNvSpPr/>
-          <p:nvPr/>
-        </p:nvSpPr>
-        <p:spPr>
-          <a:xfrm>
-            <a:off x="26880895" y="30056373"/>
-            <a:ext cx="2639972" cy="3211033"/>
-          </a:xfrm>
-          <a:prstGeom prst="rect">
-            <a:avLst/>
-          </a:prstGeom>
-          <a:noFill/>
-          <a:ln>
-            <a:noFill/>
-          </a:ln>
-        </p:spPr>
-        <p:style>
-          <a:lnRef idx="2">
-            <a:schemeClr val="accent1">
-              <a:shade val="50000"/>
-            </a:schemeClr>
-          </a:lnRef>
-          <a:fillRef idx="1">
-            <a:schemeClr val="accent1"/>
-          </a:fillRef>
-          <a:effectRef idx="0">
-            <a:schemeClr val="accent1"/>
-          </a:effectRef>
-          <a:fontRef idx="minor">
-            <a:schemeClr val="lt1"/>
-          </a:fontRef>
-        </p:style>
-        <p:txBody>
-          <a:bodyPr rtlCol="0" anchor="ctr"/>
-          <a:lstStyle/>
-          <a:p>
-            <a:pPr algn="ctr"/>
-            <a:r>
-              <a:rPr lang="fr-FR" sz="3600" b="1" dirty="0" smtClean="0">
-                <a:solidFill>
-                  <a:srgbClr val="FF0000"/>
-                </a:solidFill>
-              </a:rPr>
-              <a:t>HEAVY TAILED </a:t>
-            </a:r>
-          </a:p>
-          <a:p>
-            <a:pPr algn="ctr"/>
-            <a:r>
-              <a:rPr lang="fr-FR" sz="3600" b="1" dirty="0" smtClean="0">
-                <a:solidFill>
-                  <a:srgbClr val="FF0000"/>
-                </a:solidFill>
-              </a:rPr>
-              <a:t>Distribution</a:t>
-            </a:r>
-            <a:endParaRPr lang="fr-FR" sz="3600" b="1" dirty="0">
-              <a:solidFill>
-                <a:srgbClr val="FF0000"/>
-              </a:solidFill>
-            </a:endParaRPr>
-          </a:p>
-        </p:txBody>
-      </p:sp>
-      <p:sp>
-        <p:nvSpPr>
-          <p:cNvPr id="142" name="Rectangle 141"/>
-          <p:cNvSpPr/>
-          <p:nvPr/>
-        </p:nvSpPr>
-        <p:spPr>
-          <a:xfrm>
-            <a:off x="26675838" y="32957177"/>
-            <a:ext cx="3223572" cy="3211033"/>
-          </a:xfrm>
-          <a:prstGeom prst="rect">
-            <a:avLst/>
-          </a:prstGeom>
-          <a:noFill/>
-          <a:ln>
-            <a:noFill/>
-          </a:ln>
-        </p:spPr>
-        <p:style>
-          <a:lnRef idx="2">
-            <a:schemeClr val="accent1">
-              <a:shade val="50000"/>
-            </a:schemeClr>
-          </a:lnRef>
-          <a:fillRef idx="1">
-            <a:schemeClr val="accent1"/>
-          </a:fillRef>
-          <a:effectRef idx="0">
-            <a:schemeClr val="accent1"/>
-          </a:effectRef>
-          <a:fontRef idx="minor">
-            <a:schemeClr val="lt1"/>
-          </a:fontRef>
-        </p:style>
-        <p:txBody>
-          <a:bodyPr rtlCol="0" anchor="ctr"/>
-          <a:lstStyle/>
-          <a:p>
-            <a:pPr algn="ctr"/>
-            <a:r>
-              <a:rPr lang="fr-FR" sz="3600" dirty="0" smtClean="0">
+              <a:ln w="38100" cmpd="dbl">
                 <a:solidFill>
                   <a:schemeClr val="accent1">
                     <a:lumMod val="50000"/>
                   </a:schemeClr>
                 </a:solidFill>
-              </a:rPr>
-              <a:t>Quantile metrics ?</a:t>
-            </a:r>
-          </a:p>
-          <a:p>
-            <a:pPr algn="ctr"/>
-            <a:r>
-              <a:rPr lang="fr-FR" sz="3600" dirty="0" smtClean="0">
+              </a:ln>
+            </p:spPr>
+            <p:style>
+              <a:lnRef idx="2">
+                <a:schemeClr val="accent1">
+                  <a:shade val="50000"/>
+                </a:schemeClr>
+              </a:lnRef>
+              <a:fillRef idx="1">
+                <a:schemeClr val="accent1"/>
+              </a:fillRef>
+              <a:effectRef idx="0">
+                <a:schemeClr val="accent1"/>
+              </a:effectRef>
+              <a:fontRef idx="minor">
+                <a:schemeClr val="lt1"/>
+              </a:fontRef>
+            </p:style>
+            <p:txBody>
+              <a:bodyPr rtlCol="0" anchor="ctr"/>
+              <a:lstStyle/>
+              <a:p>
+                <a:pPr algn="ctr"/>
+                <a:endParaRPr lang="fr-FR" dirty="0"/>
+              </a:p>
+            </p:txBody>
+          </p:sp>
+          <p:sp>
+            <p:nvSpPr>
+              <p:cNvPr id="31" name="Flèche droite 30"/>
+              <p:cNvSpPr/>
+              <p:nvPr/>
+            </p:nvSpPr>
+            <p:spPr>
+              <a:xfrm>
+                <a:off x="17392529" y="10375389"/>
+                <a:ext cx="1382232" cy="899597"/>
+              </a:xfrm>
+              <a:prstGeom prst="rightArrow">
+                <a:avLst/>
+              </a:prstGeom>
+            </p:spPr>
+            <p:style>
+              <a:lnRef idx="2">
+                <a:schemeClr val="accent1">
+                  <a:shade val="50000"/>
+                </a:schemeClr>
+              </a:lnRef>
+              <a:fillRef idx="1">
+                <a:schemeClr val="accent1"/>
+              </a:fillRef>
+              <a:effectRef idx="0">
+                <a:schemeClr val="accent1"/>
+              </a:effectRef>
+              <a:fontRef idx="minor">
+                <a:schemeClr val="lt1"/>
+              </a:fontRef>
+            </p:style>
+            <p:txBody>
+              <a:bodyPr rtlCol="0" anchor="ctr"/>
+              <a:lstStyle/>
+              <a:p>
+                <a:pPr algn="ctr"/>
+                <a:endParaRPr lang="fr-FR"/>
+              </a:p>
+            </p:txBody>
+          </p:sp>
+          <p:sp>
+            <p:nvSpPr>
+              <p:cNvPr id="60" name="Rectangle à coins arrondis 59"/>
+              <p:cNvSpPr/>
+              <p:nvPr/>
+            </p:nvSpPr>
+            <p:spPr>
+              <a:xfrm>
+                <a:off x="1081364" y="7987081"/>
+                <a:ext cx="15555472" cy="5740062"/>
+              </a:xfrm>
+              <a:prstGeom prst="roundRect">
+                <a:avLst>
+                  <a:gd name="adj" fmla="val 4812"/>
+                </a:avLst>
+              </a:prstGeom>
+              <a:solidFill>
+                <a:schemeClr val="accent1">
+                  <a:lumMod val="40000"/>
+                  <a:lumOff val="60000"/>
+                </a:schemeClr>
+              </a:solidFill>
+              <a:ln w="38100">
                 <a:solidFill>
                   <a:schemeClr val="accent1">
                     <a:lumMod val="50000"/>
                   </a:schemeClr>
                 </a:solidFill>
-              </a:rPr>
-              <a:t/>
-            </a:r>
-            <a:br>
-              <a:rPr lang="fr-FR" sz="3600" dirty="0" smtClean="0">
+              </a:ln>
+            </p:spPr>
+            <p:style>
+              <a:lnRef idx="2">
+                <a:schemeClr val="accent1">
+                  <a:shade val="50000"/>
+                </a:schemeClr>
+              </a:lnRef>
+              <a:fillRef idx="1">
+                <a:schemeClr val="accent1"/>
+              </a:fillRef>
+              <a:effectRef idx="0">
+                <a:schemeClr val="accent1"/>
+              </a:effectRef>
+              <a:fontRef idx="minor">
+                <a:schemeClr val="lt1"/>
+              </a:fontRef>
+            </p:style>
+            <p:txBody>
+              <a:bodyPr rtlCol="0" anchor="ctr"/>
+              <a:lstStyle/>
+              <a:p>
+                <a:pPr>
+                  <a:lnSpc>
+                    <a:spcPct val="150000"/>
+                  </a:lnSpc>
+                </a:pPr>
+                <a:r>
+                  <a:rPr lang="fr-FR" sz="3600" b="1" dirty="0">
+                    <a:solidFill>
+                      <a:schemeClr val="tx1"/>
+                    </a:solidFill>
+                  </a:rPr>
+                  <a:t>PROJECT ENVIRE</a:t>
+                </a:r>
+              </a:p>
+              <a:p>
+                <a:pPr algn="ctr">
+                  <a:lnSpc>
+                    <a:spcPct val="150000"/>
+                  </a:lnSpc>
+                </a:pPr>
+                <a:r>
+                  <a:rPr lang="fr-FR" sz="3600" b="1" dirty="0">
+                    <a:solidFill>
+                      <a:schemeClr val="tx1"/>
+                    </a:solidFill>
+                  </a:rPr>
+                  <a:t>CONSORTIUM AND FUNDING</a:t>
+                </a:r>
+                <a:endParaRPr lang="en-US" sz="3600" dirty="0">
+                  <a:solidFill>
+                    <a:schemeClr val="tx1"/>
+                  </a:solidFill>
+                </a:endParaRPr>
+              </a:p>
+              <a:p>
+                <a:pPr marL="571500" indent="-571500">
+                  <a:buFont typeface="Arial" panose="020B0604020202020204" pitchFamily="34" charset="0"/>
+                  <a:buChar char="•"/>
+                </a:pPr>
+                <a:r>
+                  <a:rPr lang="fr-FR" sz="3600" dirty="0">
+                    <a:solidFill>
+                      <a:schemeClr val="tx1"/>
+                    </a:solidFill>
+                  </a:rPr>
+                  <a:t>Project duration: 2022-2025</a:t>
+                </a:r>
+              </a:p>
+              <a:p>
+                <a:pPr marL="571500" indent="-571500">
+                  <a:buFont typeface="Arial" panose="020B0604020202020204" pitchFamily="34" charset="0"/>
+                  <a:buChar char="•"/>
+                </a:pPr>
+                <a:r>
+                  <a:rPr lang="en-US" sz="3600" dirty="0">
+                    <a:solidFill>
+                      <a:schemeClr val="tx1"/>
+                    </a:solidFill>
+                  </a:rPr>
+                  <a:t>Germany, France, Lithuania, Poland, Tunisia</a:t>
+                </a:r>
+                <a:endParaRPr lang="fr-FR" sz="3600" dirty="0">
+                  <a:solidFill>
+                    <a:schemeClr val="tx1"/>
+                  </a:solidFill>
+                </a:endParaRPr>
+              </a:p>
+              <a:p>
+                <a:pPr marL="571500" indent="-571500">
+                  <a:buFont typeface="Arial" panose="020B0604020202020204" pitchFamily="34" charset="0"/>
+                  <a:buChar char="•"/>
+                </a:pPr>
+                <a:r>
+                  <a:rPr lang="en-US" sz="3600" dirty="0">
+                    <a:solidFill>
+                      <a:schemeClr val="tx1"/>
+                    </a:solidFill>
+                  </a:rPr>
+                  <a:t>Funded by the European Transnational Programme - </a:t>
+                </a:r>
+                <a:r>
+                  <a:rPr lang="fr-FR" sz="3600" dirty="0">
+                    <a:solidFill>
+                      <a:srgbClr val="FF0000"/>
+                    </a:solidFill>
+                  </a:rPr>
+                  <a:t>JPIAMR-ACTION</a:t>
+                </a:r>
+                <a:endParaRPr lang="en-US" sz="3600" dirty="0">
+                  <a:solidFill>
+                    <a:srgbClr val="FF0000"/>
+                  </a:solidFill>
+                </a:endParaRPr>
+              </a:p>
+              <a:p>
+                <a:pPr algn="ctr"/>
+                <a:r>
+                  <a:rPr lang="fr-FR" sz="3600" b="1" dirty="0">
+                    <a:solidFill>
+                      <a:schemeClr val="tx1"/>
+                    </a:solidFill>
+                  </a:rPr>
+                  <a:t>OBJECTIVES</a:t>
+                </a:r>
+              </a:p>
+              <a:p>
+                <a:pPr marL="571500" indent="-571500">
+                  <a:buFont typeface="Arial" panose="020B0604020202020204" pitchFamily="34" charset="0"/>
+                  <a:buChar char="•"/>
+                </a:pPr>
+                <a:r>
+                  <a:rPr lang="en-US" sz="3600" dirty="0">
+                    <a:solidFill>
+                      <a:schemeClr val="tx1"/>
+                    </a:solidFill>
+                  </a:rPr>
+                  <a:t>Reduce antimicrobial-resistant (</a:t>
+                </a:r>
+                <a:r>
+                  <a:rPr lang="en-US" sz="3600" dirty="0">
+                    <a:solidFill>
+                      <a:srgbClr val="FF0000"/>
+                    </a:solidFill>
+                  </a:rPr>
+                  <a:t>AMR</a:t>
+                </a:r>
+                <a:r>
+                  <a:rPr lang="en-US" sz="3600" dirty="0">
+                    <a:solidFill>
+                      <a:schemeClr val="tx1"/>
+                    </a:solidFill>
+                  </a:rPr>
+                  <a:t>) bacteria spread from broiler chickens</a:t>
+                </a:r>
+              </a:p>
+              <a:p>
+                <a:pPr marL="571500" indent="-571500">
+                  <a:buFont typeface="Arial" panose="020B0604020202020204" pitchFamily="34" charset="0"/>
+                  <a:buChar char="•"/>
+                </a:pPr>
+                <a:r>
+                  <a:rPr lang="en-US" sz="3600" dirty="0">
+                    <a:solidFill>
+                      <a:schemeClr val="tx1"/>
+                    </a:solidFill>
+                  </a:rPr>
+                  <a:t>Investigate the potential of various on-farm </a:t>
+                </a:r>
+                <a:r>
+                  <a:rPr lang="en-US" sz="3600" dirty="0">
+                    <a:solidFill>
+                      <a:srgbClr val="FF0000"/>
+                    </a:solidFill>
+                  </a:rPr>
+                  <a:t>intervention</a:t>
+                </a:r>
+                <a:r>
+                  <a:rPr lang="en-US" sz="3600" dirty="0">
+                    <a:solidFill>
+                      <a:schemeClr val="tx1"/>
+                    </a:solidFill>
+                  </a:rPr>
+                  <a:t> measures</a:t>
+                </a:r>
+              </a:p>
+              <a:p>
+                <a:pPr marL="571500" indent="-571500">
+                  <a:buFont typeface="Arial" panose="020B0604020202020204" pitchFamily="34" charset="0"/>
+                  <a:buChar char="•"/>
+                </a:pPr>
+                <a:r>
+                  <a:rPr lang="en-US" sz="3600" dirty="0">
+                    <a:solidFill>
+                      <a:schemeClr val="tx1"/>
+                    </a:solidFill>
+                  </a:rPr>
+                  <a:t>Reduce transmission and human exposure to ESBL </a:t>
+                </a:r>
+                <a:r>
+                  <a:rPr lang="en-US" sz="3600" i="1" dirty="0">
+                    <a:solidFill>
+                      <a:schemeClr val="tx1"/>
+                    </a:solidFill>
+                  </a:rPr>
+                  <a:t>E. </a:t>
+                </a:r>
+                <a:r>
+                  <a:rPr lang="en-US" sz="3600" i="1" dirty="0" smtClean="0">
+                    <a:solidFill>
+                      <a:schemeClr val="tx1"/>
+                    </a:solidFill>
+                  </a:rPr>
+                  <a:t>coli</a:t>
+                </a:r>
+                <a:r>
+                  <a:rPr lang="en-US" sz="3600" dirty="0" smtClean="0">
+                    <a:solidFill>
+                      <a:schemeClr val="tx1"/>
+                    </a:solidFill>
+                  </a:rPr>
+                  <a:t> </a:t>
+                </a:r>
+                <a:r>
+                  <a:rPr lang="en-US" sz="3600" dirty="0">
+                    <a:solidFill>
+                      <a:schemeClr val="tx1"/>
+                    </a:solidFill>
+                  </a:rPr>
+                  <a:t>from broiler chicken</a:t>
+                </a:r>
+              </a:p>
+              <a:p>
+                <a:pPr algn="ctr"/>
+                <a:endParaRPr lang="fr-FR" sz="3600" dirty="0">
+                  <a:solidFill>
+                    <a:schemeClr val="tx1"/>
+                  </a:solidFill>
+                </a:endParaRPr>
+              </a:p>
+            </p:txBody>
+          </p:sp>
+        </p:grpSp>
+      </p:grpSp>
+      <p:grpSp>
+        <p:nvGrpSpPr>
+          <p:cNvPr id="20" name="Groupe 19"/>
+          <p:cNvGrpSpPr/>
+          <p:nvPr/>
+        </p:nvGrpSpPr>
+        <p:grpSpPr>
+          <a:xfrm>
+            <a:off x="26424455" y="30193469"/>
+            <a:ext cx="3223572" cy="5988867"/>
+            <a:chOff x="26156980" y="30200608"/>
+            <a:chExt cx="3223572" cy="5988867"/>
+          </a:xfrm>
+        </p:grpSpPr>
+        <p:sp>
+          <p:nvSpPr>
+            <p:cNvPr id="63" name="Rectangle 62"/>
+            <p:cNvSpPr/>
+            <p:nvPr/>
+          </p:nvSpPr>
+          <p:spPr>
+            <a:xfrm>
+              <a:off x="26448780" y="30200608"/>
+              <a:ext cx="2639972" cy="3211033"/>
+            </a:xfrm>
+            <a:prstGeom prst="rect">
+              <a:avLst/>
+            </a:prstGeom>
+            <a:noFill/>
+            <a:ln>
+              <a:noFill/>
+            </a:ln>
+          </p:spPr>
+          <p:style>
+            <a:lnRef idx="2">
+              <a:schemeClr val="accent1">
+                <a:shade val="50000"/>
+              </a:schemeClr>
+            </a:lnRef>
+            <a:fillRef idx="1">
+              <a:schemeClr val="accent1"/>
+            </a:fillRef>
+            <a:effectRef idx="0">
+              <a:schemeClr val="accent1"/>
+            </a:effectRef>
+            <a:fontRef idx="minor">
+              <a:schemeClr val="lt1"/>
+            </a:fontRef>
+          </p:style>
+          <p:txBody>
+            <a:bodyPr rtlCol="0" anchor="ctr"/>
+            <a:lstStyle/>
+            <a:p>
+              <a:pPr algn="ctr"/>
+              <a:r>
+                <a:rPr lang="fr-FR" sz="3600" b="1" dirty="0" smtClean="0">
+                  <a:solidFill>
+                    <a:srgbClr val="FF0000"/>
+                  </a:solidFill>
+                </a:rPr>
+                <a:t>HEAVY TAILED </a:t>
+              </a:r>
+            </a:p>
+            <a:p>
+              <a:pPr algn="ctr"/>
+              <a:r>
+                <a:rPr lang="fr-FR" sz="3600" b="1" dirty="0" smtClean="0">
+                  <a:solidFill>
+                    <a:srgbClr val="FF0000"/>
+                  </a:solidFill>
+                </a:rPr>
+                <a:t>Distribution</a:t>
+              </a:r>
+              <a:endParaRPr lang="fr-FR" sz="3600" b="1" dirty="0">
+                <a:solidFill>
+                  <a:srgbClr val="FF0000"/>
+                </a:solidFill>
+              </a:endParaRPr>
+            </a:p>
+          </p:txBody>
+        </p:sp>
+        <p:sp>
+          <p:nvSpPr>
+            <p:cNvPr id="142" name="Rectangle 141"/>
+            <p:cNvSpPr/>
+            <p:nvPr/>
+          </p:nvSpPr>
+          <p:spPr>
+            <a:xfrm>
+              <a:off x="26156980" y="32978442"/>
+              <a:ext cx="3223572" cy="3211033"/>
+            </a:xfrm>
+            <a:prstGeom prst="rect">
+              <a:avLst/>
+            </a:prstGeom>
+            <a:noFill/>
+            <a:ln>
+              <a:noFill/>
+            </a:ln>
+          </p:spPr>
+          <p:style>
+            <a:lnRef idx="2">
+              <a:schemeClr val="accent1">
+                <a:shade val="50000"/>
+              </a:schemeClr>
+            </a:lnRef>
+            <a:fillRef idx="1">
+              <a:schemeClr val="accent1"/>
+            </a:fillRef>
+            <a:effectRef idx="0">
+              <a:schemeClr val="accent1"/>
+            </a:effectRef>
+            <a:fontRef idx="minor">
+              <a:schemeClr val="lt1"/>
+            </a:fontRef>
+          </p:style>
+          <p:txBody>
+            <a:bodyPr rtlCol="0" anchor="ctr"/>
+            <a:lstStyle/>
+            <a:p>
+              <a:pPr algn="ctr"/>
+              <a:r>
+                <a:rPr lang="fr-FR" sz="3600" dirty="0" smtClean="0">
+                  <a:solidFill>
+                    <a:schemeClr val="accent1">
+                      <a:lumMod val="50000"/>
+                    </a:schemeClr>
+                  </a:solidFill>
+                </a:rPr>
+                <a:t>Quantile metrics ?</a:t>
+              </a:r>
+            </a:p>
+            <a:p>
+              <a:pPr algn="ctr"/>
+              <a:r>
+                <a:rPr lang="fr-FR" sz="3600" dirty="0" smtClean="0">
+                  <a:solidFill>
+                    <a:schemeClr val="accent1">
+                      <a:lumMod val="50000"/>
+                    </a:schemeClr>
+                  </a:solidFill>
+                </a:rPr>
+                <a:t/>
+              </a:r>
+              <a:br>
+                <a:rPr lang="fr-FR" sz="3600" dirty="0" smtClean="0">
+                  <a:solidFill>
+                    <a:schemeClr val="accent1">
+                      <a:lumMod val="50000"/>
+                    </a:schemeClr>
+                  </a:solidFill>
+                </a:rPr>
+              </a:br>
+              <a:r>
+                <a:rPr lang="fr-FR" sz="3600" dirty="0" smtClean="0">
+                  <a:solidFill>
+                    <a:schemeClr val="accent1">
+                      <a:lumMod val="50000"/>
+                    </a:schemeClr>
+                  </a:solidFill>
+                </a:rPr>
+                <a:t>Difficult to interpret ?</a:t>
+              </a:r>
+              <a:endParaRPr lang="fr-FR" sz="3600" dirty="0">
                 <a:solidFill>
                   <a:schemeClr val="accent1">
                     <a:lumMod val="50000"/>
                   </a:schemeClr>
                 </a:solidFill>
-              </a:rPr>
-            </a:br>
-            <a:r>
-              <a:rPr lang="fr-FR" sz="3600" dirty="0" smtClean="0">
-                <a:solidFill>
-                  <a:schemeClr val="accent1">
-                    <a:lumMod val="50000"/>
-                  </a:schemeClr>
-                </a:solidFill>
-              </a:rPr>
-              <a:t>Difficult to interpret ?</a:t>
-            </a:r>
-            <a:endParaRPr lang="fr-FR" sz="3600" dirty="0">
-              <a:solidFill>
-                <a:schemeClr val="accent1">
-                  <a:lumMod val="50000"/>
-                </a:schemeClr>
-              </a:solidFill>
-            </a:endParaRPr>
-          </a:p>
-        </p:txBody>
-      </p:sp>
+              </a:endParaRPr>
+            </a:p>
+          </p:txBody>
+        </p:sp>
+      </p:grpSp>
       <p:sp>
         <p:nvSpPr>
           <p:cNvPr id="65" name="ZoneTexte 64"/>
@@ -8464,7 +8785,7 @@
       </p:sp>
       <p:pic>
         <p:nvPicPr>
-          <p:cNvPr id="67" name="Image 66"/>
+          <p:cNvPr id="6" name="Image 5"/>
           <p:cNvPicPr>
             <a:picLocks noChangeAspect="1"/>
           </p:cNvPicPr>
@@ -8484,8 +8805,8 @@
         </p:blipFill>
         <p:spPr>
           <a:xfrm>
-            <a:off x="15114338" y="26783293"/>
-            <a:ext cx="13308544" cy="1313961"/>
+            <a:off x="15726781" y="26826949"/>
+            <a:ext cx="12332195" cy="1371839"/>
           </a:xfrm>
           <a:prstGeom prst="rect">
             <a:avLst/>

</xml_diff>

<commit_message>
fix bug C_barn computation
</commit_message>
<xml_diff>
--- a/docs/Poster_ModAH_sbasak.pptx
+++ b/docs/Poster_ModAH_sbasak.pptx
@@ -197,7 +197,7 @@
           <a:p>
             <a:fld id="{30B2879C-E2E7-41DD-8C48-B2C9A03F15D4}" type="datetimeFigureOut">
               <a:rPr lang="fr-FR" smtClean="0"/>
-              <a:t>02/08/2024</a:t>
+              <a:t>29/08/2024</a:t>
             </a:fld>
             <a:endParaRPr lang="fr-FR"/>
           </a:p>
@@ -596,7 +596,7 @@
           <a:p>
             <a:fld id="{36858CB8-11F8-4AAC-AB86-67A36E1B5295}" type="datetimeFigureOut">
               <a:rPr lang="fr-FR" smtClean="0"/>
-              <a:t>02/08/2024</a:t>
+              <a:t>29/08/2024</a:t>
             </a:fld>
             <a:endParaRPr lang="fr-FR" dirty="0"/>
           </a:p>
@@ -766,7 +766,7 @@
           <a:p>
             <a:fld id="{36858CB8-11F8-4AAC-AB86-67A36E1B5295}" type="datetimeFigureOut">
               <a:rPr lang="fr-FR" smtClean="0"/>
-              <a:t>02/08/2024</a:t>
+              <a:t>29/08/2024</a:t>
             </a:fld>
             <a:endParaRPr lang="fr-FR" dirty="0"/>
           </a:p>
@@ -946,7 +946,7 @@
           <a:p>
             <a:fld id="{36858CB8-11F8-4AAC-AB86-67A36E1B5295}" type="datetimeFigureOut">
               <a:rPr lang="fr-FR" smtClean="0"/>
-              <a:t>02/08/2024</a:t>
+              <a:t>29/08/2024</a:t>
             </a:fld>
             <a:endParaRPr lang="fr-FR" dirty="0"/>
           </a:p>
@@ -1116,7 +1116,7 @@
           <a:p>
             <a:fld id="{36858CB8-11F8-4AAC-AB86-67A36E1B5295}" type="datetimeFigureOut">
               <a:rPr lang="fr-FR" smtClean="0"/>
-              <a:t>02/08/2024</a:t>
+              <a:t>29/08/2024</a:t>
             </a:fld>
             <a:endParaRPr lang="fr-FR" dirty="0"/>
           </a:p>
@@ -1360,7 +1360,7 @@
           <a:p>
             <a:fld id="{36858CB8-11F8-4AAC-AB86-67A36E1B5295}" type="datetimeFigureOut">
               <a:rPr lang="fr-FR" smtClean="0"/>
-              <a:t>02/08/2024</a:t>
+              <a:t>29/08/2024</a:t>
             </a:fld>
             <a:endParaRPr lang="fr-FR" dirty="0"/>
           </a:p>
@@ -1592,7 +1592,7 @@
           <a:p>
             <a:fld id="{36858CB8-11F8-4AAC-AB86-67A36E1B5295}" type="datetimeFigureOut">
               <a:rPr lang="fr-FR" smtClean="0"/>
-              <a:t>02/08/2024</a:t>
+              <a:t>29/08/2024</a:t>
             </a:fld>
             <a:endParaRPr lang="fr-FR" dirty="0"/>
           </a:p>
@@ -1959,7 +1959,7 @@
           <a:p>
             <a:fld id="{36858CB8-11F8-4AAC-AB86-67A36E1B5295}" type="datetimeFigureOut">
               <a:rPr lang="fr-FR" smtClean="0"/>
-              <a:t>02/08/2024</a:t>
+              <a:t>29/08/2024</a:t>
             </a:fld>
             <a:endParaRPr lang="fr-FR" dirty="0"/>
           </a:p>
@@ -2077,7 +2077,7 @@
           <a:p>
             <a:fld id="{36858CB8-11F8-4AAC-AB86-67A36E1B5295}" type="datetimeFigureOut">
               <a:rPr lang="fr-FR" smtClean="0"/>
-              <a:t>02/08/2024</a:t>
+              <a:t>29/08/2024</a:t>
             </a:fld>
             <a:endParaRPr lang="fr-FR" dirty="0"/>
           </a:p>
@@ -2172,7 +2172,7 @@
           <a:p>
             <a:fld id="{36858CB8-11F8-4AAC-AB86-67A36E1B5295}" type="datetimeFigureOut">
               <a:rPr lang="fr-FR" smtClean="0"/>
-              <a:t>02/08/2024</a:t>
+              <a:t>29/08/2024</a:t>
             </a:fld>
             <a:endParaRPr lang="fr-FR" dirty="0"/>
           </a:p>
@@ -2449,7 +2449,7 @@
           <a:p>
             <a:fld id="{36858CB8-11F8-4AAC-AB86-67A36E1B5295}" type="datetimeFigureOut">
               <a:rPr lang="fr-FR" smtClean="0"/>
-              <a:t>02/08/2024</a:t>
+              <a:t>29/08/2024</a:t>
             </a:fld>
             <a:endParaRPr lang="fr-FR" dirty="0"/>
           </a:p>
@@ -2706,7 +2706,7 @@
           <a:p>
             <a:fld id="{36858CB8-11F8-4AAC-AB86-67A36E1B5295}" type="datetimeFigureOut">
               <a:rPr lang="fr-FR" smtClean="0"/>
-              <a:t>02/08/2024</a:t>
+              <a:t>29/08/2024</a:t>
             </a:fld>
             <a:endParaRPr lang="fr-FR" dirty="0"/>
           </a:p>
@@ -2919,7 +2919,7 @@
           <a:p>
             <a:fld id="{36858CB8-11F8-4AAC-AB86-67A36E1B5295}" type="datetimeFigureOut">
               <a:rPr lang="fr-FR" smtClean="0"/>
-              <a:t>02/08/2024</a:t>
+              <a:t>29/08/2024</a:t>
             </a:fld>
             <a:endParaRPr lang="fr-FR" dirty="0"/>
           </a:p>
@@ -3532,11 +3532,6 @@
               </a:rPr>
               <a:t>Berlin, Germany </a:t>
             </a:r>
-            <a:endParaRPr lang="fr-FR" sz="4800" dirty="0" smtClean="0">
-              <a:solidFill>
-                <a:schemeClr val="bg1"/>
-              </a:solidFill>
-            </a:endParaRPr>
           </a:p>
         </p:txBody>
       </p:sp>
@@ -4662,11 +4657,7 @@
                       </a:r>
                       <a:r>
                         <a:rPr lang="fr-FR" sz="3600" dirty="0" smtClean="0"/>
-                        <a:t> </a:t>
-                      </a:r>
-                      <a:r>
-                        <a:rPr lang="fr-FR" sz="3600" dirty="0" smtClean="0"/>
-                        <a:t>and </a:t>
+                        <a:t> and </a:t>
                       </a:r>
                       <a:r>
                         <a:rPr lang="fr-FR" sz="3600" dirty="0" smtClean="0">
@@ -5366,7 +5357,6 @@
                       <a:rPr lang="fr-FR" sz="3600" b="1" dirty="0" smtClean="0"/>
                       <a:t>WithinFlock </a:t>
                     </a:r>
-                    <a:endParaRPr lang="fr-FR" sz="3600" b="1" dirty="0" smtClean="0"/>
                   </a:p>
                   <a:p>
                     <a:pPr algn="ctr"/>
@@ -6038,7 +6028,6 @@
                               <a:rPr lang="fr-FR" sz="3600" b="1" dirty="0" smtClean="0"/>
                               <a:t>Transfer</a:t>
                             </a:r>
-                            <a:endParaRPr lang="fr-FR" sz="3600" b="1" dirty="0" smtClean="0"/>
                           </a:p>
                         </p:txBody>
                       </p:sp>
@@ -6634,15 +6623,7 @@
                         <a:schemeClr val="tx1"/>
                       </a:solidFill>
                     </a:rPr>
-                    <a:t>in</a:t>
-                  </a:r>
-                  <a:r>
-                    <a:rPr lang="fr-FR" sz="3600" b="1" dirty="0" smtClean="0">
-                      <a:solidFill>
-                        <a:schemeClr val="tx1"/>
-                      </a:solidFill>
-                    </a:rPr>
-                    <a:t> processing</a:t>
+                    <a:t>in processing</a:t>
                   </a:r>
                   <a:endParaRPr lang="fr-FR" sz="3600" b="1" dirty="0">
                     <a:solidFill>
@@ -6822,15 +6803,7 @@
                         <a:schemeClr val="tx1"/>
                       </a:solidFill>
                     </a:rPr>
-                    <a:t>Flock </a:t>
-                  </a:r>
-                  <a:r>
-                    <a:rPr lang="fr-FR" sz="3600" b="1" dirty="0" smtClean="0">
-                      <a:solidFill>
-                        <a:schemeClr val="tx1"/>
-                      </a:solidFill>
-                    </a:rPr>
-                    <a:t>Risk </a:t>
+                    <a:t>Flock Risk </a:t>
                   </a:r>
                   <a:r>
                     <a:rPr lang="fr-FR" sz="3600" b="1" dirty="0">
@@ -7306,15 +7279,7 @@
                       <a:schemeClr val="tx1"/>
                     </a:solidFill>
                   </a:rPr>
-                  <a:t> carriage by consumer</a:t>
-                </a:r>
-                <a:r>
-                  <a:rPr lang="fr-FR" sz="3600" b="1" dirty="0" smtClean="0">
-                    <a:solidFill>
-                      <a:schemeClr val="tx1"/>
-                    </a:solidFill>
-                  </a:rPr>
-                  <a:t> </a:t>
+                  <a:t> carriage by consumer </a:t>
                 </a:r>
                 <a:r>
                   <a:rPr lang="fr-FR" sz="3600" b="1" dirty="0">
@@ -7350,7 +7315,7 @@
                 </a:r>
                 <a14:m>
                   <m:oMath xmlns:m="http://schemas.openxmlformats.org/officeDocument/2006/math">
-                    <a:fld id="{A6AC258B-BBF2-40CF-B999-D86047CA68F5}" type="mathplaceholder">
+                    <a:fld id="{2A909327-20DC-4699-A0AB-12C018C666F9}" type="mathplaceholder">
                       <a:rPr lang="fr-FR" sz="3600" i="1">
                         <a:latin typeface="Cambria Math" panose="02040503050406030204" pitchFamily="18" charset="0"/>
                       </a:rPr>
@@ -7401,15 +7366,7 @@
                       <a:schemeClr val="tx1"/>
                     </a:solidFill>
                   </a:rPr>
-                  <a:t>Average </a:t>
-                </a:r>
-                <a:r>
-                  <a:rPr lang="fr-FR" sz="3600" dirty="0" smtClean="0">
-                    <a:solidFill>
-                      <a:schemeClr val="tx1"/>
-                    </a:solidFill>
-                  </a:rPr>
-                  <a:t>risk </a:t>
+                  <a:t>Average risk </a:t>
                 </a:r>
                 <a:r>
                   <a:rPr lang="fr-FR" sz="3600" dirty="0">
@@ -7446,7 +7403,7 @@
                   <a:t>defined by input parameters Ɵ </a:t>
                 </a:r>
                 <a:r>
-                  <a:rPr lang="fr-FR" sz="3600" dirty="0">
+                  <a:rPr lang="fr-FR" sz="3600">
                     <a:solidFill>
                       <a:schemeClr val="tx1"/>
                     </a:solidFill>
@@ -7454,12 +7411,12 @@
                   <a:t>: </a:t>
                 </a:r>
                 <a:r>
-                  <a:rPr lang="fr-FR" sz="3600" dirty="0" smtClean="0">
+                  <a:rPr lang="fr-FR" sz="3600" smtClean="0">
                     <a:solidFill>
                       <a:srgbClr val="FF0000"/>
                     </a:solidFill>
                   </a:rPr>
-                  <a:t>1.4e-5</a:t>
+                  <a:t>1.4e-4</a:t>
                 </a:r>
                 <a:endParaRPr lang="fr-FR" sz="3600" dirty="0" smtClean="0">
                   <a:solidFill>
@@ -7585,23 +7542,7 @@
                   <a:schemeClr val="tx1"/>
                 </a:solidFill>
               </a:rPr>
-              <a:t>Food-borne QRA </a:t>
-            </a:r>
-            <a:r>
-              <a:rPr lang="fr-FR" sz="3600" b="1" dirty="0" smtClean="0">
-                <a:solidFill>
-                  <a:schemeClr val="tx1"/>
-                </a:solidFill>
-              </a:rPr>
-              <a:t>module </a:t>
-            </a:r>
-            <a:r>
-              <a:rPr lang="fr-FR" sz="3600" b="1" dirty="0" smtClean="0">
-                <a:solidFill>
-                  <a:schemeClr val="tx1"/>
-                </a:solidFill>
-              </a:rPr>
-              <a:t>perspectives</a:t>
+              <a:t>Food-borne QRA module perspectives</a:t>
             </a:r>
             <a:endParaRPr lang="fr-FR" sz="3600" b="1" dirty="0">
               <a:solidFill>
@@ -7697,15 +7638,7 @@
                   <a:schemeClr val="tx1"/>
                 </a:solidFill>
               </a:rPr>
-              <a:t> </a:t>
-            </a:r>
-            <a:r>
-              <a:rPr lang="fr-FR" sz="3600" dirty="0" smtClean="0">
-                <a:solidFill>
-                  <a:schemeClr val="tx1"/>
-                </a:solidFill>
-              </a:rPr>
-              <a:t>country protocols</a:t>
+              <a:t> country protocols</a:t>
             </a:r>
             <a:endParaRPr lang="fr-FR" sz="3600" dirty="0" smtClean="0">
               <a:solidFill>

</xml_diff>